<commit_message>
Updated pricing page in report
</commit_message>
<xml_diff>
--- a/Assets/Backgrounds/Demand Background.pptx
+++ b/Assets/Backgrounds/Demand Background.pptx
@@ -5,12 +5,13 @@
     <p:sldMasterId id="2147483660" r:id="rId1"/>
   </p:sldMasterIdLst>
   <p:notesMasterIdLst>
-    <p:notesMasterId r:id="rId5"/>
+    <p:notesMasterId r:id="rId6"/>
   </p:notesMasterIdLst>
   <p:sldIdLst>
     <p:sldId id="256" r:id="rId2"/>
-    <p:sldId id="260" r:id="rId3"/>
-    <p:sldId id="269" r:id="rId4"/>
+    <p:sldId id="270" r:id="rId3"/>
+    <p:sldId id="260" r:id="rId4"/>
+    <p:sldId id="269" r:id="rId5"/>
   </p:sldIdLst>
   <p:sldSz cx="14630400" cy="8229600"/>
   <p:notesSz cx="6858000" cy="9144000"/>
@@ -131,7 +132,7 @@
 <file path=ppt/revisionInfo.xml><?xml version="1.0" encoding="utf-8"?>
 <p1510:revInfo xmlns:a="http://schemas.openxmlformats.org/drawingml/2006/main" xmlns:r="http://schemas.openxmlformats.org/officeDocument/2006/relationships" xmlns:p1510="http://schemas.microsoft.com/office/powerpoint/2015/10/main">
   <p1510:revLst>
-    <p1510:client id="{73EF7C00-CEA6-417E-9225-931A981C833B}" v="46" dt="2025-04-06T15:05:04.479"/>
+    <p1510:client id="{73EF7C00-CEA6-417E-9225-931A981C833B}" v="59" dt="2025-04-13T07:01:34.519"/>
   </p1510:revLst>
 </p1510:revInfo>
 </file>
@@ -140,35 +141,59 @@
 <pc:chgInfo xmlns:a="http://schemas.openxmlformats.org/drawingml/2006/main" xmlns:r="http://schemas.openxmlformats.org/officeDocument/2006/relationships" xmlns:ac="http://schemas.microsoft.com/office/drawing/2013/main/command" xmlns:pc="http://schemas.microsoft.com/office/powerpoint/2013/main/command">
   <pc:docChgLst>
     <pc:chgData name="Andrew" userId="36c5b73e-58a9-45e0-b191-7481baa14d1c" providerId="ADAL" clId="{73EF7C00-CEA6-417E-9225-931A981C833B}"/>
-    <pc:docChg chg="undo custSel addSld modSld">
-      <pc:chgData name="Andrew" userId="36c5b73e-58a9-45e0-b191-7481baa14d1c" providerId="ADAL" clId="{73EF7C00-CEA6-417E-9225-931A981C833B}" dt="2025-04-06T16:12:59.721" v="319" actId="1038"/>
+    <pc:docChg chg="undo custSel addSld delSld modSld">
+      <pc:chgData name="Andrew" userId="36c5b73e-58a9-45e0-b191-7481baa14d1c" providerId="ADAL" clId="{73EF7C00-CEA6-417E-9225-931A981C833B}" dt="2025-04-13T07:00:43.289" v="406" actId="478"/>
       <pc:docMkLst>
         <pc:docMk/>
       </pc:docMkLst>
       <pc:sldChg chg="addSp delSp modSp mod setBg">
-        <pc:chgData name="Andrew" userId="36c5b73e-58a9-45e0-b191-7481baa14d1c" providerId="ADAL" clId="{73EF7C00-CEA6-417E-9225-931A981C833B}" dt="2025-04-06T16:12:59.721" v="319" actId="1038"/>
+        <pc:chgData name="Andrew" userId="36c5b73e-58a9-45e0-b191-7481baa14d1c" providerId="ADAL" clId="{73EF7C00-CEA6-417E-9225-931A981C833B}" dt="2025-04-13T06:58:57.158" v="396"/>
         <pc:sldMkLst>
           <pc:docMk/>
           <pc:sldMk cId="3915621456" sldId="256"/>
         </pc:sldMkLst>
+        <pc:spChg chg="add del mod">
+          <ac:chgData name="Andrew" userId="36c5b73e-58a9-45e0-b191-7481baa14d1c" providerId="ADAL" clId="{73EF7C00-CEA6-417E-9225-931A981C833B}" dt="2025-04-12T08:09:16.860" v="358" actId="478"/>
+          <ac:spMkLst>
+            <pc:docMk/>
+            <pc:sldMk cId="3915621456" sldId="256"/>
+            <ac:spMk id="2" creationId="{2386C1B1-419C-27E0-1DED-D41823642EBE}"/>
+          </ac:spMkLst>
+        </pc:spChg>
+        <pc:spChg chg="add del mod">
+          <ac:chgData name="Andrew" userId="36c5b73e-58a9-45e0-b191-7481baa14d1c" providerId="ADAL" clId="{73EF7C00-CEA6-417E-9225-931A981C833B}" dt="2025-04-12T08:12:18.407" v="388" actId="478"/>
+          <ac:spMkLst>
+            <pc:docMk/>
+            <pc:sldMk cId="3915621456" sldId="256"/>
+            <ac:spMk id="3" creationId="{1E5B55D1-9FC1-438B-BAF7-907F32C4A423}"/>
+          </ac:spMkLst>
+        </pc:spChg>
+        <pc:spChg chg="add mod">
+          <ac:chgData name="Andrew" userId="36c5b73e-58a9-45e0-b191-7481baa14d1c" providerId="ADAL" clId="{73EF7C00-CEA6-417E-9225-931A981C833B}" dt="2025-04-12T08:12:42.934" v="390" actId="408"/>
+          <ac:spMkLst>
+            <pc:docMk/>
+            <pc:sldMk cId="3915621456" sldId="256"/>
+            <ac:spMk id="4" creationId="{9BC9176F-4013-EA92-26E3-D5A0CB170B6D}"/>
+          </ac:spMkLst>
+        </pc:spChg>
         <pc:spChg chg="mod">
-          <ac:chgData name="Andrew" userId="36c5b73e-58a9-45e0-b191-7481baa14d1c" providerId="ADAL" clId="{73EF7C00-CEA6-417E-9225-931A981C833B}" dt="2025-04-06T12:57:58.009" v="186" actId="465"/>
+          <ac:chgData name="Andrew" userId="36c5b73e-58a9-45e0-b191-7481baa14d1c" providerId="ADAL" clId="{73EF7C00-CEA6-417E-9225-931A981C833B}" dt="2025-04-12T08:12:27.265" v="389" actId="14100"/>
           <ac:spMkLst>
             <pc:docMk/>
             <pc:sldMk cId="3915621456" sldId="256"/>
             <ac:spMk id="6" creationId="{FA73749B-981F-FF20-7305-3D9C9B574609}"/>
           </ac:spMkLst>
         </pc:spChg>
-        <pc:spChg chg="mod">
-          <ac:chgData name="Andrew" userId="36c5b73e-58a9-45e0-b191-7481baa14d1c" providerId="ADAL" clId="{73EF7C00-CEA6-417E-9225-931A981C833B}" dt="2025-04-06T12:58:12.157" v="187" actId="554"/>
+        <pc:spChg chg="del mod">
+          <ac:chgData name="Andrew" userId="36c5b73e-58a9-45e0-b191-7481baa14d1c" providerId="ADAL" clId="{73EF7C00-CEA6-417E-9225-931A981C833B}" dt="2025-04-12T08:11:01.442" v="375" actId="478"/>
           <ac:spMkLst>
             <pc:docMk/>
             <pc:sldMk cId="3915621456" sldId="256"/>
             <ac:spMk id="7" creationId="{39F3ADE7-7377-91F5-ACF2-381BEDFADBFE}"/>
           </ac:spMkLst>
         </pc:spChg>
-        <pc:spChg chg="mod">
-          <ac:chgData name="Andrew" userId="36c5b73e-58a9-45e0-b191-7481baa14d1c" providerId="ADAL" clId="{73EF7C00-CEA6-417E-9225-931A981C833B}" dt="2025-04-06T12:58:12.157" v="187" actId="554"/>
+        <pc:spChg chg="del mod">
+          <ac:chgData name="Andrew" userId="36c5b73e-58a9-45e0-b191-7481baa14d1c" providerId="ADAL" clId="{73EF7C00-CEA6-417E-9225-931A981C833B}" dt="2025-04-12T08:10:52.467" v="373" actId="478"/>
           <ac:spMkLst>
             <pc:docMk/>
             <pc:sldMk cId="3915621456" sldId="256"/>
@@ -176,7 +201,7 @@
           </ac:spMkLst>
         </pc:spChg>
         <pc:spChg chg="mod">
-          <ac:chgData name="Andrew" userId="36c5b73e-58a9-45e0-b191-7481baa14d1c" providerId="ADAL" clId="{73EF7C00-CEA6-417E-9225-931A981C833B}" dt="2025-04-06T12:58:12.157" v="187" actId="554"/>
+          <ac:chgData name="Andrew" userId="36c5b73e-58a9-45e0-b191-7481baa14d1c" providerId="ADAL" clId="{73EF7C00-CEA6-417E-9225-931A981C833B}" dt="2025-04-12T08:11:13.349" v="378" actId="554"/>
           <ac:spMkLst>
             <pc:docMk/>
             <pc:sldMk cId="3915621456" sldId="256"/>
@@ -184,19 +209,19 @@
           </ac:spMkLst>
         </pc:spChg>
         <pc:spChg chg="mod">
-          <ac:chgData name="Andrew" userId="36c5b73e-58a9-45e0-b191-7481baa14d1c" providerId="ADAL" clId="{73EF7C00-CEA6-417E-9225-931A981C833B}" dt="2025-04-06T12:57:42.045" v="173" actId="1035"/>
+          <ac:chgData name="Andrew" userId="36c5b73e-58a9-45e0-b191-7481baa14d1c" providerId="ADAL" clId="{73EF7C00-CEA6-417E-9225-931A981C833B}" dt="2025-04-12T08:12:16.710" v="387" actId="14100"/>
           <ac:spMkLst>
             <pc:docMk/>
             <pc:sldMk cId="3915621456" sldId="256"/>
             <ac:spMk id="10" creationId="{C1A8628F-F918-FB84-5BB8-D6E8E973C1FA}"/>
           </ac:spMkLst>
         </pc:spChg>
-        <pc:spChg chg="del mod">
-          <ac:chgData name="Andrew" userId="36c5b73e-58a9-45e0-b191-7481baa14d1c" providerId="ADAL" clId="{73EF7C00-CEA6-417E-9225-931A981C833B}" dt="2025-04-06T12:50:22.086" v="117" actId="478"/>
+        <pc:spChg chg="add mod">
+          <ac:chgData name="Andrew" userId="36c5b73e-58a9-45e0-b191-7481baa14d1c" providerId="ADAL" clId="{73EF7C00-CEA6-417E-9225-931A981C833B}" dt="2025-04-12T08:12:06.853" v="385" actId="1076"/>
           <ac:spMkLst>
             <pc:docMk/>
             <pc:sldMk cId="3915621456" sldId="256"/>
-            <ac:spMk id="11" creationId="{A08F2E39-AD3B-FB2E-6689-905DE9B56AA0}"/>
+            <ac:spMk id="11" creationId="{510F9B7E-45A7-11B7-E51D-4E234D1D52C8}"/>
           </ac:spMkLst>
         </pc:spChg>
         <pc:spChg chg="mod">
@@ -223,16 +248,8 @@
             <ac:spMk id="16" creationId="{908496E2-72C3-206E-953B-ACA11BFDA1DD}"/>
           </ac:spMkLst>
         </pc:spChg>
-        <pc:spChg chg="del mod topLvl">
-          <ac:chgData name="Andrew" userId="36c5b73e-58a9-45e0-b191-7481baa14d1c" providerId="ADAL" clId="{73EF7C00-CEA6-417E-9225-931A981C833B}" dt="2025-04-06T12:50:41.846" v="121" actId="478"/>
-          <ac:spMkLst>
-            <pc:docMk/>
-            <pc:sldMk cId="3915621456" sldId="256"/>
-            <ac:spMk id="17" creationId="{E29389D0-ACF6-69E8-4257-9819B2636B34}"/>
-          </ac:spMkLst>
-        </pc:spChg>
-        <pc:spChg chg="add mod">
-          <ac:chgData name="Andrew" userId="36c5b73e-58a9-45e0-b191-7481baa14d1c" providerId="ADAL" clId="{73EF7C00-CEA6-417E-9225-931A981C833B}" dt="2025-04-06T12:56:32.589" v="158" actId="11530"/>
+        <pc:spChg chg="add del mod">
+          <ac:chgData name="Andrew" userId="36c5b73e-58a9-45e0-b191-7481baa14d1c" providerId="ADAL" clId="{73EF7C00-CEA6-417E-9225-931A981C833B}" dt="2025-04-12T07:59:00.762" v="321" actId="478"/>
           <ac:spMkLst>
             <pc:docMk/>
             <pc:sldMk cId="3915621456" sldId="256"/>
@@ -271,16 +288,8 @@
             <ac:grpSpMk id="12" creationId="{C0B253B6-3FA2-FCC5-DB08-D6391AC86B65}"/>
           </ac:grpSpMkLst>
         </pc:grpChg>
-        <pc:grpChg chg="add del mod">
-          <ac:chgData name="Andrew" userId="36c5b73e-58a9-45e0-b191-7481baa14d1c" providerId="ADAL" clId="{73EF7C00-CEA6-417E-9225-931A981C833B}" dt="2025-04-06T12:50:41.846" v="121" actId="478"/>
-          <ac:grpSpMkLst>
-            <pc:docMk/>
-            <pc:sldMk cId="3915621456" sldId="256"/>
-            <ac:grpSpMk id="15" creationId="{3D5F3A6A-C853-A63C-12B8-B1E6F6B15CD9}"/>
-          </ac:grpSpMkLst>
-        </pc:grpChg>
         <pc:grpChg chg="add mod">
-          <ac:chgData name="Andrew" userId="36c5b73e-58a9-45e0-b191-7481baa14d1c" providerId="ADAL" clId="{73EF7C00-CEA6-417E-9225-931A981C833B}" dt="2025-04-06T14:52:33.438" v="265" actId="14100"/>
+          <ac:chgData name="Andrew" userId="36c5b73e-58a9-45e0-b191-7481baa14d1c" providerId="ADAL" clId="{73EF7C00-CEA6-417E-9225-931A981C833B}" dt="2025-04-12T08:06:27.557" v="329" actId="554"/>
           <ac:grpSpMkLst>
             <pc:docMk/>
             <pc:sldMk cId="3915621456" sldId="256"/>
@@ -293,30 +302,6 @@
             <pc:docMk/>
             <pc:sldMk cId="3915621456" sldId="256"/>
             <ac:picMk id="5" creationId="{7985FA9C-6422-2502-12EF-9FDD2B913BBE}"/>
-          </ac:picMkLst>
-        </pc:picChg>
-        <pc:picChg chg="add del mod ord">
-          <ac:chgData name="Andrew" userId="36c5b73e-58a9-45e0-b191-7481baa14d1c" providerId="ADAL" clId="{73EF7C00-CEA6-417E-9225-931A981C833B}" dt="2025-04-06T14:43:06.562" v="241" actId="478"/>
-          <ac:picMkLst>
-            <pc:docMk/>
-            <pc:sldMk cId="3915621456" sldId="256"/>
-            <ac:picMk id="21" creationId="{E727A158-DEC0-0CA2-99A8-B6E8D7B0EF10}"/>
-          </ac:picMkLst>
-        </pc:picChg>
-        <pc:picChg chg="add del mod">
-          <ac:chgData name="Andrew" userId="36c5b73e-58a9-45e0-b191-7481baa14d1c" providerId="ADAL" clId="{73EF7C00-CEA6-417E-9225-931A981C833B}" dt="2025-04-06T14:43:05.711" v="240" actId="478"/>
-          <ac:picMkLst>
-            <pc:docMk/>
-            <pc:sldMk cId="3915621456" sldId="256"/>
-            <ac:picMk id="23" creationId="{DF089F80-9090-E95C-E51B-5FACEB055BA8}"/>
-          </ac:picMkLst>
-        </pc:picChg>
-        <pc:picChg chg="add del mod">
-          <ac:chgData name="Andrew" userId="36c5b73e-58a9-45e0-b191-7481baa14d1c" providerId="ADAL" clId="{73EF7C00-CEA6-417E-9225-931A981C833B}" dt="2025-04-06T14:48:24.695" v="259" actId="478"/>
-          <ac:picMkLst>
-            <pc:docMk/>
-            <pc:sldMk cId="3915621456" sldId="256"/>
-            <ac:picMk id="25" creationId="{0614CB80-B2D8-86A0-DB64-B10C49B66BFA}"/>
           </ac:picMkLst>
         </pc:picChg>
         <pc:picChg chg="add mod">
@@ -334,94 +319,6 @@
           <pc:docMk/>
           <pc:sldMk cId="802474073" sldId="269"/>
         </pc:sldMkLst>
-        <pc:picChg chg="del">
-          <ac:chgData name="Andrew" userId="36c5b73e-58a9-45e0-b191-7481baa14d1c" providerId="ADAL" clId="{73EF7C00-CEA6-417E-9225-931A981C833B}" dt="2025-04-06T15:02:01.799" v="287" actId="478"/>
-          <ac:picMkLst>
-            <pc:docMk/>
-            <pc:sldMk cId="802474073" sldId="269"/>
-            <ac:picMk id="2" creationId="{8CC2BD88-8D40-08BD-736B-A0D372B0AA1D}"/>
-          </ac:picMkLst>
-        </pc:picChg>
-        <pc:picChg chg="del">
-          <ac:chgData name="Andrew" userId="36c5b73e-58a9-45e0-b191-7481baa14d1c" providerId="ADAL" clId="{73EF7C00-CEA6-417E-9225-931A981C833B}" dt="2025-04-06T15:02:01.799" v="287" actId="478"/>
-          <ac:picMkLst>
-            <pc:docMk/>
-            <pc:sldMk cId="802474073" sldId="269"/>
-            <ac:picMk id="3" creationId="{4D62C4A0-4F3E-D522-6626-0602C091D243}"/>
-          </ac:picMkLst>
-        </pc:picChg>
-        <pc:picChg chg="del">
-          <ac:chgData name="Andrew" userId="36c5b73e-58a9-45e0-b191-7481baa14d1c" providerId="ADAL" clId="{73EF7C00-CEA6-417E-9225-931A981C833B}" dt="2025-04-06T15:02:01.799" v="287" actId="478"/>
-          <ac:picMkLst>
-            <pc:docMk/>
-            <pc:sldMk cId="802474073" sldId="269"/>
-            <ac:picMk id="4" creationId="{4F7F4F8A-05EE-D2CF-4D3C-217E1F00F09F}"/>
-          </ac:picMkLst>
-        </pc:picChg>
-        <pc:picChg chg="del">
-          <ac:chgData name="Andrew" userId="36c5b73e-58a9-45e0-b191-7481baa14d1c" providerId="ADAL" clId="{73EF7C00-CEA6-417E-9225-931A981C833B}" dt="2025-04-06T15:02:04.904" v="288" actId="478"/>
-          <ac:picMkLst>
-            <pc:docMk/>
-            <pc:sldMk cId="802474073" sldId="269"/>
-            <ac:picMk id="5" creationId="{67D3C99F-371D-3E2A-11BF-BE7043817BDE}"/>
-          </ac:picMkLst>
-        </pc:picChg>
-        <pc:picChg chg="del">
-          <ac:chgData name="Andrew" userId="36c5b73e-58a9-45e0-b191-7481baa14d1c" providerId="ADAL" clId="{73EF7C00-CEA6-417E-9225-931A981C833B}" dt="2025-04-06T15:02:01.799" v="287" actId="478"/>
-          <ac:picMkLst>
-            <pc:docMk/>
-            <pc:sldMk cId="802474073" sldId="269"/>
-            <ac:picMk id="6" creationId="{E8D794D7-0626-22D5-3FF5-BE65EEA15844}"/>
-          </ac:picMkLst>
-        </pc:picChg>
-        <pc:picChg chg="del">
-          <ac:chgData name="Andrew" userId="36c5b73e-58a9-45e0-b191-7481baa14d1c" providerId="ADAL" clId="{73EF7C00-CEA6-417E-9225-931A981C833B}" dt="2025-04-06T15:02:04.904" v="288" actId="478"/>
-          <ac:picMkLst>
-            <pc:docMk/>
-            <pc:sldMk cId="802474073" sldId="269"/>
-            <ac:picMk id="7" creationId="{97E57E82-C92D-C6BD-B674-09157732ABF8}"/>
-          </ac:picMkLst>
-        </pc:picChg>
-        <pc:picChg chg="del">
-          <ac:chgData name="Andrew" userId="36c5b73e-58a9-45e0-b191-7481baa14d1c" providerId="ADAL" clId="{73EF7C00-CEA6-417E-9225-931A981C833B}" dt="2025-04-06T15:02:01.799" v="287" actId="478"/>
-          <ac:picMkLst>
-            <pc:docMk/>
-            <pc:sldMk cId="802474073" sldId="269"/>
-            <ac:picMk id="8" creationId="{BD3498D3-38F1-E12B-FFFC-84557D637F71}"/>
-          </ac:picMkLst>
-        </pc:picChg>
-        <pc:picChg chg="del">
-          <ac:chgData name="Andrew" userId="36c5b73e-58a9-45e0-b191-7481baa14d1c" providerId="ADAL" clId="{73EF7C00-CEA6-417E-9225-931A981C833B}" dt="2025-04-06T15:02:04.904" v="288" actId="478"/>
-          <ac:picMkLst>
-            <pc:docMk/>
-            <pc:sldMk cId="802474073" sldId="269"/>
-            <ac:picMk id="9" creationId="{6F0AB2F6-D111-F8BF-47C2-1FA5A5F11448}"/>
-          </ac:picMkLst>
-        </pc:picChg>
-        <pc:picChg chg="del">
-          <ac:chgData name="Andrew" userId="36c5b73e-58a9-45e0-b191-7481baa14d1c" providerId="ADAL" clId="{73EF7C00-CEA6-417E-9225-931A981C833B}" dt="2025-04-06T15:02:01.799" v="287" actId="478"/>
-          <ac:picMkLst>
-            <pc:docMk/>
-            <pc:sldMk cId="802474073" sldId="269"/>
-            <ac:picMk id="10" creationId="{EA7B8B5C-69D7-649E-E185-84CDDE2210E8}"/>
-          </ac:picMkLst>
-        </pc:picChg>
-        <pc:picChg chg="del">
-          <ac:chgData name="Andrew" userId="36c5b73e-58a9-45e0-b191-7481baa14d1c" providerId="ADAL" clId="{73EF7C00-CEA6-417E-9225-931A981C833B}" dt="2025-04-06T15:02:01.799" v="287" actId="478"/>
-          <ac:picMkLst>
-            <pc:docMk/>
-            <pc:sldMk cId="802474073" sldId="269"/>
-            <ac:picMk id="11" creationId="{DD940412-2B27-9756-A7E1-43B44B49FF2B}"/>
-          </ac:picMkLst>
-        </pc:picChg>
-        <pc:picChg chg="del">
-          <ac:chgData name="Andrew" userId="36c5b73e-58a9-45e0-b191-7481baa14d1c" providerId="ADAL" clId="{73EF7C00-CEA6-417E-9225-931A981C833B}" dt="2025-04-06T15:01:53.243" v="286" actId="478"/>
-          <ac:picMkLst>
-            <pc:docMk/>
-            <pc:sldMk cId="802474073" sldId="269"/>
-            <ac:picMk id="13" creationId="{DB53F151-DFD9-7DEE-22D9-5ED83D9A2A8C}"/>
-          </ac:picMkLst>
-        </pc:picChg>
         <pc:picChg chg="add mod">
           <ac:chgData name="Andrew" userId="36c5b73e-58a9-45e0-b191-7481baa14d1c" providerId="ADAL" clId="{73EF7C00-CEA6-417E-9225-931A981C833B}" dt="2025-04-06T15:14:04.392" v="306" actId="207"/>
           <ac:picMkLst>
@@ -430,36 +327,12 @@
             <ac:picMk id="14" creationId="{5270A918-E27C-6809-4579-60193575ABD3}"/>
           </ac:picMkLst>
         </pc:picChg>
-        <pc:picChg chg="del">
-          <ac:chgData name="Andrew" userId="36c5b73e-58a9-45e0-b191-7481baa14d1c" providerId="ADAL" clId="{73EF7C00-CEA6-417E-9225-931A981C833B}" dt="2025-04-06T15:01:53.243" v="286" actId="478"/>
-          <ac:picMkLst>
-            <pc:docMk/>
-            <pc:sldMk cId="802474073" sldId="269"/>
-            <ac:picMk id="15" creationId="{B30AABC7-AF7A-11C7-2E12-A781A6C06103}"/>
-          </ac:picMkLst>
-        </pc:picChg>
         <pc:picChg chg="add mod">
           <ac:chgData name="Andrew" userId="36c5b73e-58a9-45e0-b191-7481baa14d1c" providerId="ADAL" clId="{73EF7C00-CEA6-417E-9225-931A981C833B}" dt="2025-04-06T15:01:36.396" v="283" actId="1076"/>
           <ac:picMkLst>
             <pc:docMk/>
             <pc:sldMk cId="802474073" sldId="269"/>
             <ac:picMk id="16" creationId="{514E1A14-C293-A7AC-155C-B525755BB7DE}"/>
-          </ac:picMkLst>
-        </pc:picChg>
-        <pc:picChg chg="del">
-          <ac:chgData name="Andrew" userId="36c5b73e-58a9-45e0-b191-7481baa14d1c" providerId="ADAL" clId="{73EF7C00-CEA6-417E-9225-931A981C833B}" dt="2025-04-06T15:01:53.243" v="286" actId="478"/>
-          <ac:picMkLst>
-            <pc:docMk/>
-            <pc:sldMk cId="802474073" sldId="269"/>
-            <ac:picMk id="17" creationId="{A3D75CB6-2379-1A09-D015-A5A03FD62BE2}"/>
-          </ac:picMkLst>
-        </pc:picChg>
-        <pc:picChg chg="del">
-          <ac:chgData name="Andrew" userId="36c5b73e-58a9-45e0-b191-7481baa14d1c" providerId="ADAL" clId="{73EF7C00-CEA6-417E-9225-931A981C833B}" dt="2025-04-06T15:01:53.243" v="286" actId="478"/>
-          <ac:picMkLst>
-            <pc:docMk/>
-            <pc:sldMk cId="802474073" sldId="269"/>
-            <ac:picMk id="19" creationId="{9E3906CC-6724-F0CC-4E62-52051DE6AC4B}"/>
           </ac:picMkLst>
         </pc:picChg>
         <pc:picChg chg="add mod">
@@ -494,46 +367,6 @@
             <ac:picMk id="23" creationId="{D293623B-04BD-6AC8-1CE0-44907F2572A1}"/>
           </ac:picMkLst>
         </pc:picChg>
-        <pc:picChg chg="del mod">
-          <ac:chgData name="Andrew" userId="36c5b73e-58a9-45e0-b191-7481baa14d1c" providerId="ADAL" clId="{73EF7C00-CEA6-417E-9225-931A981C833B}" dt="2025-04-06T15:01:33.303" v="282" actId="478"/>
-          <ac:picMkLst>
-            <pc:docMk/>
-            <pc:sldMk cId="802474073" sldId="269"/>
-            <ac:picMk id="24" creationId="{A67E66A9-8852-5B8D-B88B-D99EEC4C026B}"/>
-          </ac:picMkLst>
-        </pc:picChg>
-        <pc:picChg chg="del mod">
-          <ac:chgData name="Andrew" userId="36c5b73e-58a9-45e0-b191-7481baa14d1c" providerId="ADAL" clId="{73EF7C00-CEA6-417E-9225-931A981C833B}" dt="2025-04-06T15:01:33.303" v="282" actId="478"/>
-          <ac:picMkLst>
-            <pc:docMk/>
-            <pc:sldMk cId="802474073" sldId="269"/>
-            <ac:picMk id="25" creationId="{816A42EA-AB98-316D-FAA2-FD502B6B7175}"/>
-          </ac:picMkLst>
-        </pc:picChg>
-        <pc:picChg chg="del mod">
-          <ac:chgData name="Andrew" userId="36c5b73e-58a9-45e0-b191-7481baa14d1c" providerId="ADAL" clId="{73EF7C00-CEA6-417E-9225-931A981C833B}" dt="2025-04-06T15:01:33.303" v="282" actId="478"/>
-          <ac:picMkLst>
-            <pc:docMk/>
-            <pc:sldMk cId="802474073" sldId="269"/>
-            <ac:picMk id="26" creationId="{33842DB8-11A0-442D-7C68-C3D7E3D2320E}"/>
-          </ac:picMkLst>
-        </pc:picChg>
-        <pc:picChg chg="del mod">
-          <ac:chgData name="Andrew" userId="36c5b73e-58a9-45e0-b191-7481baa14d1c" providerId="ADAL" clId="{73EF7C00-CEA6-417E-9225-931A981C833B}" dt="2025-04-06T15:01:33.303" v="282" actId="478"/>
-          <ac:picMkLst>
-            <pc:docMk/>
-            <pc:sldMk cId="802474073" sldId="269"/>
-            <ac:picMk id="27" creationId="{E752978B-4F29-19B1-3082-2704F8F49094}"/>
-          </ac:picMkLst>
-        </pc:picChg>
-        <pc:picChg chg="del mod">
-          <ac:chgData name="Andrew" userId="36c5b73e-58a9-45e0-b191-7481baa14d1c" providerId="ADAL" clId="{73EF7C00-CEA6-417E-9225-931A981C833B}" dt="2025-04-06T15:01:33.303" v="282" actId="478"/>
-          <ac:picMkLst>
-            <pc:docMk/>
-            <pc:sldMk cId="802474073" sldId="269"/>
-            <ac:picMk id="28" creationId="{4A12D1F1-E4C1-424B-4681-BA24B092243D}"/>
-          </ac:picMkLst>
-        </pc:picChg>
         <pc:picChg chg="mod">
           <ac:chgData name="Andrew" userId="36c5b73e-58a9-45e0-b191-7481baa14d1c" providerId="ADAL" clId="{73EF7C00-CEA6-417E-9225-931A981C833B}" dt="2025-04-06T15:15:37.723" v="307" actId="207"/>
           <ac:picMkLst>
@@ -550,46 +383,67 @@
             <ac:picMk id="30" creationId="{D2FBE698-2497-6688-9E0F-8381B3B84497}"/>
           </ac:picMkLst>
         </pc:picChg>
-        <pc:picChg chg="del mod">
-          <ac:chgData name="Andrew" userId="36c5b73e-58a9-45e0-b191-7481baa14d1c" providerId="ADAL" clId="{73EF7C00-CEA6-417E-9225-931A981C833B}" dt="2025-04-06T15:01:42.485" v="284" actId="478"/>
-          <ac:picMkLst>
+      </pc:sldChg>
+      <pc:sldChg chg="add del">
+        <pc:chgData name="Andrew" userId="36c5b73e-58a9-45e0-b191-7481baa14d1c" providerId="ADAL" clId="{73EF7C00-CEA6-417E-9225-931A981C833B}" dt="2025-04-13T07:00:20.261" v="398" actId="47"/>
+        <pc:sldMkLst>
+          <pc:docMk/>
+          <pc:sldMk cId="495032596" sldId="270"/>
+        </pc:sldMkLst>
+      </pc:sldChg>
+      <pc:sldChg chg="add del setBg">
+        <pc:chgData name="Andrew" userId="36c5b73e-58a9-45e0-b191-7481baa14d1c" providerId="ADAL" clId="{73EF7C00-CEA6-417E-9225-931A981C833B}" dt="2025-04-13T07:00:31.059" v="400" actId="47"/>
+        <pc:sldMkLst>
+          <pc:docMk/>
+          <pc:sldMk cId="520420066" sldId="270"/>
+        </pc:sldMkLst>
+      </pc:sldChg>
+      <pc:sldChg chg="delSp add mod">
+        <pc:chgData name="Andrew" userId="36c5b73e-58a9-45e0-b191-7481baa14d1c" providerId="ADAL" clId="{73EF7C00-CEA6-417E-9225-931A981C833B}" dt="2025-04-13T07:00:43.289" v="406" actId="478"/>
+        <pc:sldMkLst>
+          <pc:docMk/>
+          <pc:sldMk cId="4289022660" sldId="270"/>
+        </pc:sldMkLst>
+        <pc:spChg chg="del">
+          <ac:chgData name="Andrew" userId="36c5b73e-58a9-45e0-b191-7481baa14d1c" providerId="ADAL" clId="{73EF7C00-CEA6-417E-9225-931A981C833B}" dt="2025-04-13T07:00:41.527" v="404" actId="478"/>
+          <ac:spMkLst>
             <pc:docMk/>
-            <pc:sldMk cId="802474073" sldId="269"/>
-            <ac:picMk id="31" creationId="{6FD3E4FC-9020-67C9-31D3-900A73EB587A}"/>
-          </ac:picMkLst>
-        </pc:picChg>
-        <pc:picChg chg="del mod">
-          <ac:chgData name="Andrew" userId="36c5b73e-58a9-45e0-b191-7481baa14d1c" providerId="ADAL" clId="{73EF7C00-CEA6-417E-9225-931A981C833B}" dt="2025-04-06T15:01:42.485" v="284" actId="478"/>
-          <ac:picMkLst>
+            <pc:sldMk cId="4289022660" sldId="270"/>
+            <ac:spMk id="4" creationId="{786DBC1C-A267-74B0-037A-C82A6CB0EA5E}"/>
+          </ac:spMkLst>
+        </pc:spChg>
+        <pc:spChg chg="del">
+          <ac:chgData name="Andrew" userId="36c5b73e-58a9-45e0-b191-7481baa14d1c" providerId="ADAL" clId="{73EF7C00-CEA6-417E-9225-931A981C833B}" dt="2025-04-13T07:00:39.805" v="402" actId="478"/>
+          <ac:spMkLst>
             <pc:docMk/>
-            <pc:sldMk cId="802474073" sldId="269"/>
-            <ac:picMk id="32" creationId="{BB9B43ED-80F7-C64C-B315-2C2E8D3A27B5}"/>
-          </ac:picMkLst>
-        </pc:picChg>
-        <pc:picChg chg="del mod">
-          <ac:chgData name="Andrew" userId="36c5b73e-58a9-45e0-b191-7481baa14d1c" providerId="ADAL" clId="{73EF7C00-CEA6-417E-9225-931A981C833B}" dt="2025-04-06T15:01:42.485" v="284" actId="478"/>
-          <ac:picMkLst>
+            <pc:sldMk cId="4289022660" sldId="270"/>
+            <ac:spMk id="6" creationId="{07E74311-0901-DE2E-E67A-3BBB0317DCB1}"/>
+          </ac:spMkLst>
+        </pc:spChg>
+        <pc:spChg chg="del">
+          <ac:chgData name="Andrew" userId="36c5b73e-58a9-45e0-b191-7481baa14d1c" providerId="ADAL" clId="{73EF7C00-CEA6-417E-9225-931A981C833B}" dt="2025-04-13T07:00:40.745" v="403" actId="478"/>
+          <ac:spMkLst>
             <pc:docMk/>
-            <pc:sldMk cId="802474073" sldId="269"/>
-            <ac:picMk id="33" creationId="{8B5E7E65-9BC3-E8B4-CA29-92F9C72D3427}"/>
-          </ac:picMkLst>
-        </pc:picChg>
-        <pc:picChg chg="del mod">
-          <ac:chgData name="Andrew" userId="36c5b73e-58a9-45e0-b191-7481baa14d1c" providerId="ADAL" clId="{73EF7C00-CEA6-417E-9225-931A981C833B}" dt="2025-04-06T15:01:42.485" v="284" actId="478"/>
-          <ac:picMkLst>
+            <pc:sldMk cId="4289022660" sldId="270"/>
+            <ac:spMk id="9" creationId="{D342E7EA-6C79-1BFA-CB3E-8CF5F1CD5244}"/>
+          </ac:spMkLst>
+        </pc:spChg>
+        <pc:spChg chg="del">
+          <ac:chgData name="Andrew" userId="36c5b73e-58a9-45e0-b191-7481baa14d1c" providerId="ADAL" clId="{73EF7C00-CEA6-417E-9225-931A981C833B}" dt="2025-04-13T07:00:43.289" v="406" actId="478"/>
+          <ac:spMkLst>
             <pc:docMk/>
-            <pc:sldMk cId="802474073" sldId="269"/>
-            <ac:picMk id="34" creationId="{60465C18-57A0-81A6-BD2C-914F3E7EC267}"/>
-          </ac:picMkLst>
-        </pc:picChg>
-        <pc:picChg chg="del mod">
-          <ac:chgData name="Andrew" userId="36c5b73e-58a9-45e0-b191-7481baa14d1c" providerId="ADAL" clId="{73EF7C00-CEA6-417E-9225-931A981C833B}" dt="2025-04-06T15:01:42.485" v="284" actId="478"/>
-          <ac:picMkLst>
+            <pc:sldMk cId="4289022660" sldId="270"/>
+            <ac:spMk id="10" creationId="{9FBBAC05-CF76-433F-C08B-6D24268CA189}"/>
+          </ac:spMkLst>
+        </pc:spChg>
+        <pc:spChg chg="del">
+          <ac:chgData name="Andrew" userId="36c5b73e-58a9-45e0-b191-7481baa14d1c" providerId="ADAL" clId="{73EF7C00-CEA6-417E-9225-931A981C833B}" dt="2025-04-13T07:00:42.232" v="405" actId="478"/>
+          <ac:spMkLst>
             <pc:docMk/>
-            <pc:sldMk cId="802474073" sldId="269"/>
-            <ac:picMk id="35" creationId="{2E5EB58C-7F3B-CED4-FCB7-B596789F49C5}"/>
-          </ac:picMkLst>
-        </pc:picChg>
+            <pc:sldMk cId="4289022660" sldId="270"/>
+            <ac:spMk id="11" creationId="{7A89D8F4-E238-53C7-A228-CD9B676515E1}"/>
+          </ac:spMkLst>
+        </pc:spChg>
       </pc:sldChg>
     </pc:docChg>
   </pc:docChgLst>
@@ -678,7 +532,7 @@
           <a:p>
             <a:fld id="{4CF10B02-57E9-42D5-8D07-6EFA539A5EF5}" type="datetimeFigureOut">
               <a:rPr lang="en-GB" smtClean="0"/>
-              <a:t>06/04/2025</a:t>
+              <a:t>13/04/2025</a:t>
             </a:fld>
             <a:endParaRPr lang="en-GB"/>
           </a:p>
@@ -1011,7 +865,7 @@
           <a:p>
             <a:fld id="{7070B6CD-3126-4638-AAB2-C888F006EC93}" type="slidenum">
               <a:rPr lang="en-GB" smtClean="0"/>
-              <a:t>3</a:t>
+              <a:t>4</a:t>
             </a:fld>
             <a:endParaRPr lang="en-GB"/>
           </a:p>
@@ -1161,7 +1015,7 @@
           <a:p>
             <a:fld id="{BAECE617-0988-4F0C-938E-A811736645F6}" type="datetimeFigureOut">
               <a:rPr lang="en-GB" smtClean="0"/>
-              <a:t>06/04/2025</a:t>
+              <a:t>13/04/2025</a:t>
             </a:fld>
             <a:endParaRPr lang="en-GB"/>
           </a:p>
@@ -1331,7 +1185,7 @@
           <a:p>
             <a:fld id="{BAECE617-0988-4F0C-938E-A811736645F6}" type="datetimeFigureOut">
               <a:rPr lang="en-GB" smtClean="0"/>
-              <a:t>06/04/2025</a:t>
+              <a:t>13/04/2025</a:t>
             </a:fld>
             <a:endParaRPr lang="en-GB"/>
           </a:p>
@@ -1511,7 +1365,7 @@
           <a:p>
             <a:fld id="{BAECE617-0988-4F0C-938E-A811736645F6}" type="datetimeFigureOut">
               <a:rPr lang="en-GB" smtClean="0"/>
-              <a:t>06/04/2025</a:t>
+              <a:t>13/04/2025</a:t>
             </a:fld>
             <a:endParaRPr lang="en-GB"/>
           </a:p>
@@ -1681,7 +1535,7 @@
           <a:p>
             <a:fld id="{BAECE617-0988-4F0C-938E-A811736645F6}" type="datetimeFigureOut">
               <a:rPr lang="en-GB" smtClean="0"/>
-              <a:t>06/04/2025</a:t>
+              <a:t>13/04/2025</a:t>
             </a:fld>
             <a:endParaRPr lang="en-GB"/>
           </a:p>
@@ -1927,7 +1781,7 @@
           <a:p>
             <a:fld id="{BAECE617-0988-4F0C-938E-A811736645F6}" type="datetimeFigureOut">
               <a:rPr lang="en-GB" smtClean="0"/>
-              <a:t>06/04/2025</a:t>
+              <a:t>13/04/2025</a:t>
             </a:fld>
             <a:endParaRPr lang="en-GB"/>
           </a:p>
@@ -2159,7 +2013,7 @@
           <a:p>
             <a:fld id="{BAECE617-0988-4F0C-938E-A811736645F6}" type="datetimeFigureOut">
               <a:rPr lang="en-GB" smtClean="0"/>
-              <a:t>06/04/2025</a:t>
+              <a:t>13/04/2025</a:t>
             </a:fld>
             <a:endParaRPr lang="en-GB"/>
           </a:p>
@@ -2526,7 +2380,7 @@
           <a:p>
             <a:fld id="{BAECE617-0988-4F0C-938E-A811736645F6}" type="datetimeFigureOut">
               <a:rPr lang="en-GB" smtClean="0"/>
-              <a:t>06/04/2025</a:t>
+              <a:t>13/04/2025</a:t>
             </a:fld>
             <a:endParaRPr lang="en-GB"/>
           </a:p>
@@ -2644,7 +2498,7 @@
           <a:p>
             <a:fld id="{BAECE617-0988-4F0C-938E-A811736645F6}" type="datetimeFigureOut">
               <a:rPr lang="en-GB" smtClean="0"/>
-              <a:t>06/04/2025</a:t>
+              <a:t>13/04/2025</a:t>
             </a:fld>
             <a:endParaRPr lang="en-GB"/>
           </a:p>
@@ -2739,7 +2593,7 @@
           <a:p>
             <a:fld id="{BAECE617-0988-4F0C-938E-A811736645F6}" type="datetimeFigureOut">
               <a:rPr lang="en-GB" smtClean="0"/>
-              <a:t>06/04/2025</a:t>
+              <a:t>13/04/2025</a:t>
             </a:fld>
             <a:endParaRPr lang="en-GB"/>
           </a:p>
@@ -3016,7 +2870,7 @@
           <a:p>
             <a:fld id="{BAECE617-0988-4F0C-938E-A811736645F6}" type="datetimeFigureOut">
               <a:rPr lang="en-GB" smtClean="0"/>
-              <a:t>06/04/2025</a:t>
+              <a:t>13/04/2025</a:t>
             </a:fld>
             <a:endParaRPr lang="en-GB"/>
           </a:p>
@@ -3273,7 +3127,7 @@
           <a:p>
             <a:fld id="{BAECE617-0988-4F0C-938E-A811736645F6}" type="datetimeFigureOut">
               <a:rPr lang="en-GB" smtClean="0"/>
-              <a:t>06/04/2025</a:t>
+              <a:t>13/04/2025</a:t>
             </a:fld>
             <a:endParaRPr lang="en-GB"/>
           </a:p>
@@ -3486,7 +3340,7 @@
           <a:p>
             <a:fld id="{BAECE617-0988-4F0C-938E-A811736645F6}" type="datetimeFigureOut">
               <a:rPr lang="en-GB" smtClean="0"/>
-              <a:t>06/04/2025</a:t>
+              <a:t>13/04/2025</a:t>
             </a:fld>
             <a:endParaRPr lang="en-GB"/>
           </a:p>
@@ -3880,10 +3734,9 @@
     <p:bg>
       <p:bgPr>
         <a:solidFill>
-          <a:schemeClr val="bg1">
-            <a:lumMod val="75000"/>
-            <a:alpha val="50000"/>
-          </a:schemeClr>
+          <a:srgbClr val="BEC5CC">
+            <a:alpha val="49804"/>
+          </a:srgbClr>
         </a:solidFill>
         <a:effectLst/>
       </p:bgPr>
@@ -3952,8 +3805,8 @@
         </p:nvSpPr>
         <p:spPr>
           <a:xfrm>
-            <a:off x="748620" y="1405878"/>
-            <a:ext cx="13600426" cy="1373794"/>
+            <a:off x="1248382" y="633046"/>
+            <a:ext cx="12971063" cy="1373794"/>
           </a:xfrm>
           <a:prstGeom prst="roundRect">
             <a:avLst>
@@ -3994,114 +3847,6 @@
       </p:sp>
       <p:sp>
         <p:nvSpPr>
-          <p:cNvPr id="7" name="Rectangle: Rounded Corners 6">
-            <a:extLst>
-              <a:ext uri="{FF2B5EF4-FFF2-40B4-BE49-F238E27FC236}">
-                <a16:creationId xmlns:a16="http://schemas.microsoft.com/office/drawing/2014/main" id="{39F3ADE7-7377-91F5-ACF2-381BEDFADBFE}"/>
-              </a:ext>
-            </a:extLst>
-          </p:cNvPr>
-          <p:cNvSpPr/>
-          <p:nvPr/>
-        </p:nvSpPr>
-        <p:spPr>
-          <a:xfrm>
-            <a:off x="10386645" y="2956823"/>
-            <a:ext cx="3962401" cy="2243012"/>
-          </a:xfrm>
-          <a:prstGeom prst="roundRect">
-            <a:avLst>
-              <a:gd name="adj" fmla="val 3699"/>
-            </a:avLst>
-          </a:prstGeom>
-          <a:solidFill>
-            <a:schemeClr val="bg1"/>
-          </a:solidFill>
-          <a:ln>
-            <a:noFill/>
-          </a:ln>
-        </p:spPr>
-        <p:style>
-          <a:lnRef idx="2">
-            <a:schemeClr val="accent1">
-              <a:shade val="15000"/>
-            </a:schemeClr>
-          </a:lnRef>
-          <a:fillRef idx="1">
-            <a:schemeClr val="accent1"/>
-          </a:fillRef>
-          <a:effectRef idx="0">
-            <a:schemeClr val="accent1"/>
-          </a:effectRef>
-          <a:fontRef idx="minor">
-            <a:schemeClr val="lt1"/>
-          </a:fontRef>
-        </p:style>
-        <p:txBody>
-          <a:bodyPr rtlCol="0" anchor="ctr"/>
-          <a:lstStyle/>
-          <a:p>
-            <a:pPr algn="ctr"/>
-            <a:endParaRPr lang="en-GB"/>
-          </a:p>
-        </p:txBody>
-      </p:sp>
-      <p:sp>
-        <p:nvSpPr>
-          <p:cNvPr id="8" name="Rectangle: Rounded Corners 7">
-            <a:extLst>
-              <a:ext uri="{FF2B5EF4-FFF2-40B4-BE49-F238E27FC236}">
-                <a16:creationId xmlns:a16="http://schemas.microsoft.com/office/drawing/2014/main" id="{23047E59-E47E-DC29-CA7C-F86657A7CA2F}"/>
-              </a:ext>
-            </a:extLst>
-          </p:cNvPr>
-          <p:cNvSpPr/>
-          <p:nvPr/>
-        </p:nvSpPr>
-        <p:spPr>
-          <a:xfrm>
-            <a:off x="5545014" y="2956823"/>
-            <a:ext cx="4380524" cy="2243014"/>
-          </a:xfrm>
-          <a:prstGeom prst="roundRect">
-            <a:avLst>
-              <a:gd name="adj" fmla="val 3351"/>
-            </a:avLst>
-          </a:prstGeom>
-          <a:solidFill>
-            <a:schemeClr val="bg1"/>
-          </a:solidFill>
-          <a:ln>
-            <a:noFill/>
-          </a:ln>
-        </p:spPr>
-        <p:style>
-          <a:lnRef idx="2">
-            <a:schemeClr val="accent1">
-              <a:shade val="15000"/>
-            </a:schemeClr>
-          </a:lnRef>
-          <a:fillRef idx="1">
-            <a:schemeClr val="accent1"/>
-          </a:fillRef>
-          <a:effectRef idx="0">
-            <a:schemeClr val="accent1"/>
-          </a:effectRef>
-          <a:fontRef idx="minor">
-            <a:schemeClr val="lt1"/>
-          </a:fontRef>
-        </p:style>
-        <p:txBody>
-          <a:bodyPr rtlCol="0" anchor="ctr"/>
-          <a:lstStyle/>
-          <a:p>
-            <a:pPr algn="ctr"/>
-            <a:endParaRPr lang="en-GB"/>
-          </a:p>
-        </p:txBody>
-      </p:sp>
-      <p:sp>
-        <p:nvSpPr>
           <p:cNvPr id="9" name="Rectangle: Rounded Corners 8">
             <a:extLst>
               <a:ext uri="{FF2B5EF4-FFF2-40B4-BE49-F238E27FC236}">
@@ -4114,8 +3859,8 @@
         </p:nvSpPr>
         <p:spPr>
           <a:xfrm>
-            <a:off x="748620" y="2956823"/>
-            <a:ext cx="4335287" cy="2243013"/>
+            <a:off x="1248383" y="2404415"/>
+            <a:ext cx="4076540" cy="2588075"/>
           </a:xfrm>
           <a:prstGeom prst="roundRect">
             <a:avLst>
@@ -4168,8 +3913,8 @@
         </p:nvSpPr>
         <p:spPr>
           <a:xfrm>
-            <a:off x="748620" y="5376987"/>
-            <a:ext cx="13600426" cy="2243015"/>
+            <a:off x="1248383" y="5353539"/>
+            <a:ext cx="12971062" cy="2243015"/>
           </a:xfrm>
           <a:prstGeom prst="roundRect">
             <a:avLst>
@@ -4546,58 +4291,6 @@
       </p:sp>
       <p:sp>
         <p:nvSpPr>
-          <p:cNvPr id="18" name="Rectangle: Rounded Corners 17">
-            <a:extLst>
-              <a:ext uri="{FF2B5EF4-FFF2-40B4-BE49-F238E27FC236}">
-                <a16:creationId xmlns:a16="http://schemas.microsoft.com/office/drawing/2014/main" id="{412908FA-8F92-9085-0A14-BC5E765F0BC0}"/>
-              </a:ext>
-            </a:extLst>
-          </p:cNvPr>
-          <p:cNvSpPr/>
-          <p:nvPr/>
-        </p:nvSpPr>
-        <p:spPr>
-          <a:xfrm>
-            <a:off x="748620" y="633046"/>
-            <a:ext cx="13600426" cy="595681"/>
-          </a:xfrm>
-          <a:prstGeom prst="roundRect">
-            <a:avLst/>
-          </a:prstGeom>
-          <a:solidFill>
-            <a:schemeClr val="bg1"/>
-          </a:solidFill>
-          <a:ln>
-            <a:noFill/>
-          </a:ln>
-        </p:spPr>
-        <p:style>
-          <a:lnRef idx="2">
-            <a:schemeClr val="accent1">
-              <a:shade val="15000"/>
-            </a:schemeClr>
-          </a:lnRef>
-          <a:fillRef idx="1">
-            <a:schemeClr val="accent1"/>
-          </a:fillRef>
-          <a:effectRef idx="0">
-            <a:schemeClr val="accent1"/>
-          </a:effectRef>
-          <a:fontRef idx="minor">
-            <a:schemeClr val="lt1"/>
-          </a:fontRef>
-        </p:style>
-        <p:txBody>
-          <a:bodyPr rtlCol="0" anchor="ctr"/>
-          <a:lstStyle/>
-          <a:p>
-            <a:pPr algn="ctr"/>
-            <a:endParaRPr lang="en-GB"/>
-          </a:p>
-        </p:txBody>
-      </p:sp>
-      <p:sp>
-        <p:nvSpPr>
           <p:cNvPr id="19" name="TextBox 18">
             <a:extLst>
               <a:ext uri="{FF2B5EF4-FFF2-40B4-BE49-F238E27FC236}">
@@ -4801,7 +4494,7 @@
         <p:grpSpPr>
           <a:xfrm>
             <a:off x="-4114" y="633046"/>
-            <a:ext cx="648677" cy="6986956"/>
+            <a:ext cx="823072" cy="6986956"/>
             <a:chOff x="-349" y="1094155"/>
             <a:chExt cx="764946" cy="6520147"/>
           </a:xfrm>
@@ -4858,7 +4551,7 @@
             <a:lstStyle/>
             <a:p>
               <a:pPr algn="ctr"/>
-              <a:endParaRPr lang="en-GB">
+              <a:endParaRPr lang="en-GB" dirty="0">
                 <a:gradFill flip="none" rotWithShape="1">
                   <a:gsLst>
                     <a:gs pos="0">
@@ -4979,6 +4672,114 @@
           </p:txBody>
         </p:sp>
       </p:grpSp>
+      <p:sp>
+        <p:nvSpPr>
+          <p:cNvPr id="4" name="Rectangle: Rounded Corners 3">
+            <a:extLst>
+              <a:ext uri="{FF2B5EF4-FFF2-40B4-BE49-F238E27FC236}">
+                <a16:creationId xmlns:a16="http://schemas.microsoft.com/office/drawing/2014/main" id="{9BC9176F-4013-EA92-26E3-D5A0CB170B6D}"/>
+              </a:ext>
+            </a:extLst>
+          </p:cNvPr>
+          <p:cNvSpPr/>
+          <p:nvPr/>
+        </p:nvSpPr>
+        <p:spPr>
+          <a:xfrm>
+            <a:off x="5682190" y="2404415"/>
+            <a:ext cx="4076540" cy="2588075"/>
+          </a:xfrm>
+          <a:prstGeom prst="roundRect">
+            <a:avLst>
+              <a:gd name="adj" fmla="val 4048"/>
+            </a:avLst>
+          </a:prstGeom>
+          <a:solidFill>
+            <a:schemeClr val="bg1"/>
+          </a:solidFill>
+          <a:ln>
+            <a:noFill/>
+          </a:ln>
+        </p:spPr>
+        <p:style>
+          <a:lnRef idx="2">
+            <a:schemeClr val="accent1">
+              <a:shade val="15000"/>
+            </a:schemeClr>
+          </a:lnRef>
+          <a:fillRef idx="1">
+            <a:schemeClr val="accent1"/>
+          </a:fillRef>
+          <a:effectRef idx="0">
+            <a:schemeClr val="accent1"/>
+          </a:effectRef>
+          <a:fontRef idx="minor">
+            <a:schemeClr val="lt1"/>
+          </a:fontRef>
+        </p:style>
+        <p:txBody>
+          <a:bodyPr rtlCol="0" anchor="ctr"/>
+          <a:lstStyle/>
+          <a:p>
+            <a:pPr algn="ctr"/>
+            <a:endParaRPr lang="en-GB"/>
+          </a:p>
+        </p:txBody>
+      </p:sp>
+      <p:sp>
+        <p:nvSpPr>
+          <p:cNvPr id="11" name="Rectangle: Rounded Corners 10">
+            <a:extLst>
+              <a:ext uri="{FF2B5EF4-FFF2-40B4-BE49-F238E27FC236}">
+                <a16:creationId xmlns:a16="http://schemas.microsoft.com/office/drawing/2014/main" id="{510F9B7E-45A7-11B7-E51D-4E234D1D52C8}"/>
+              </a:ext>
+            </a:extLst>
+          </p:cNvPr>
+          <p:cNvSpPr/>
+          <p:nvPr/>
+        </p:nvSpPr>
+        <p:spPr>
+          <a:xfrm>
+            <a:off x="10115998" y="2386152"/>
+            <a:ext cx="4076540" cy="2588075"/>
+          </a:xfrm>
+          <a:prstGeom prst="roundRect">
+            <a:avLst>
+              <a:gd name="adj" fmla="val 4048"/>
+            </a:avLst>
+          </a:prstGeom>
+          <a:solidFill>
+            <a:schemeClr val="bg1"/>
+          </a:solidFill>
+          <a:ln>
+            <a:noFill/>
+          </a:ln>
+        </p:spPr>
+        <p:style>
+          <a:lnRef idx="2">
+            <a:schemeClr val="accent1">
+              <a:shade val="15000"/>
+            </a:schemeClr>
+          </a:lnRef>
+          <a:fillRef idx="1">
+            <a:schemeClr val="accent1"/>
+          </a:fillRef>
+          <a:effectRef idx="0">
+            <a:schemeClr val="accent1"/>
+          </a:effectRef>
+          <a:fontRef idx="minor">
+            <a:schemeClr val="lt1"/>
+          </a:fontRef>
+        </p:style>
+        <p:txBody>
+          <a:bodyPr rtlCol="0" anchor="ctr"/>
+          <a:lstStyle/>
+          <a:p>
+            <a:pPr algn="ctr"/>
+            <a:endParaRPr lang="en-GB"/>
+          </a:p>
+        </p:txBody>
+      </p:sp>
     </p:spTree>
     <p:extLst>
       <p:ext uri="{BB962C8B-B14F-4D97-AF65-F5344CB8AC3E}">
@@ -4993,6 +4794,807 @@
 </file>
 
 <file path=ppt/slides/slide2.xml><?xml version="1.0" encoding="utf-8"?>
+<p:sld xmlns:a="http://schemas.openxmlformats.org/drawingml/2006/main" xmlns:r="http://schemas.openxmlformats.org/officeDocument/2006/relationships" xmlns:p="http://schemas.openxmlformats.org/presentationml/2006/main">
+  <p:cSld>
+    <p:bg>
+      <p:bgPr>
+        <a:solidFill>
+          <a:srgbClr val="BEC5CC">
+            <a:alpha val="49804"/>
+          </a:srgbClr>
+        </a:solidFill>
+        <a:effectLst/>
+      </p:bgPr>
+    </p:bg>
+    <p:spTree>
+      <p:nvGrpSpPr>
+        <p:cNvPr id="1" name="">
+          <a:extLst>
+            <a:ext uri="{FF2B5EF4-FFF2-40B4-BE49-F238E27FC236}">
+              <a16:creationId xmlns:a16="http://schemas.microsoft.com/office/drawing/2014/main" id="{90FA6259-FA4E-000C-BF0B-8C5B5CFC992A}"/>
+            </a:ext>
+          </a:extLst>
+        </p:cNvPr>
+        <p:cNvGrpSpPr/>
+        <p:nvPr/>
+      </p:nvGrpSpPr>
+      <p:grpSpPr>
+        <a:xfrm>
+          <a:off x="0" y="0"/>
+          <a:ext cx="0" cy="0"/>
+          <a:chOff x="0" y="0"/>
+          <a:chExt cx="0" cy="0"/>
+        </a:xfrm>
+      </p:grpSpPr>
+      <p:pic>
+        <p:nvPicPr>
+          <p:cNvPr id="5" name="Picture 4" descr="A screenshot of a computer" hidden="1">
+            <a:extLst>
+              <a:ext uri="{FF2B5EF4-FFF2-40B4-BE49-F238E27FC236}">
+                <a16:creationId xmlns:a16="http://schemas.microsoft.com/office/drawing/2014/main" id="{D6A9456A-41A8-2889-7E05-59A356D355D8}"/>
+              </a:ext>
+            </a:extLst>
+          </p:cNvPr>
+          <p:cNvPicPr>
+            <a:picLocks noChangeAspect="1"/>
+          </p:cNvPicPr>
+          <p:nvPr/>
+        </p:nvPicPr>
+        <p:blipFill>
+          <a:blip r:embed="rId2">
+            <a:extLst>
+              <a:ext uri="{28A0092B-C50C-407E-A947-70E740481C1C}">
+                <a14:useLocalDpi xmlns:a14="http://schemas.microsoft.com/office/drawing/2010/main" val="0"/>
+              </a:ext>
+            </a:extLst>
+          </a:blip>
+          <a:stretch>
+            <a:fillRect/>
+          </a:stretch>
+        </p:blipFill>
+        <p:spPr>
+          <a:xfrm>
+            <a:off x="0" y="15317"/>
+            <a:ext cx="14630400" cy="8198966"/>
+          </a:xfrm>
+          <a:prstGeom prst="rect">
+            <a:avLst/>
+          </a:prstGeom>
+        </p:spPr>
+      </p:pic>
+      <p:grpSp>
+        <p:nvGrpSpPr>
+          <p:cNvPr id="12" name="Group 11">
+            <a:extLst>
+              <a:ext uri="{FF2B5EF4-FFF2-40B4-BE49-F238E27FC236}">
+                <a16:creationId xmlns:a16="http://schemas.microsoft.com/office/drawing/2014/main" id="{1D817013-2CA6-561E-3BD1-BF9FD2AF5105}"/>
+              </a:ext>
+            </a:extLst>
+          </p:cNvPr>
+          <p:cNvGrpSpPr/>
+          <p:nvPr/>
+        </p:nvGrpSpPr>
+        <p:grpSpPr>
+          <a:xfrm>
+            <a:off x="-60564" y="7776309"/>
+            <a:ext cx="14816010" cy="609756"/>
+            <a:chOff x="-56171" y="7768341"/>
+            <a:chExt cx="14742739" cy="469097"/>
+          </a:xfrm>
+          <a:solidFill>
+            <a:schemeClr val="bg1">
+              <a:lumMod val="95000"/>
+            </a:schemeClr>
+          </a:solidFill>
+        </p:grpSpPr>
+        <p:sp>
+          <p:nvSpPr>
+            <p:cNvPr id="13" name="Rectangle 12">
+              <a:extLst>
+                <a:ext uri="{FF2B5EF4-FFF2-40B4-BE49-F238E27FC236}">
+                  <a16:creationId xmlns:a16="http://schemas.microsoft.com/office/drawing/2014/main" id="{4EC5832E-4A7C-BC68-79D0-13BCC73A8C80}"/>
+                </a:ext>
+              </a:extLst>
+            </p:cNvPr>
+            <p:cNvSpPr/>
+            <p:nvPr/>
+          </p:nvSpPr>
+          <p:spPr>
+            <a:xfrm rot="10800000">
+              <a:off x="-56171" y="7768341"/>
+              <a:ext cx="14742739" cy="469097"/>
+            </a:xfrm>
+            <a:prstGeom prst="rect">
+              <a:avLst/>
+            </a:prstGeom>
+            <a:grpFill/>
+            <a:ln w="41275">
+              <a:gradFill flip="none" rotWithShape="1">
+                <a:gsLst>
+                  <a:gs pos="0">
+                    <a:schemeClr val="bg1">
+                      <a:lumMod val="65000"/>
+                    </a:schemeClr>
+                  </a:gs>
+                  <a:gs pos="74000">
+                    <a:schemeClr val="tx1">
+                      <a:lumMod val="50000"/>
+                      <a:lumOff val="50000"/>
+                    </a:schemeClr>
+                  </a:gs>
+                  <a:gs pos="83000">
+                    <a:schemeClr val="tx1">
+                      <a:lumMod val="65000"/>
+                      <a:lumOff val="35000"/>
+                    </a:schemeClr>
+                  </a:gs>
+                  <a:gs pos="100000">
+                    <a:schemeClr val="tx1">
+                      <a:lumMod val="85000"/>
+                      <a:lumOff val="15000"/>
+                    </a:schemeClr>
+                  </a:gs>
+                </a:gsLst>
+                <a:lin ang="10800000" scaled="1"/>
+                <a:tileRect/>
+              </a:gradFill>
+            </a:ln>
+          </p:spPr>
+          <p:style>
+            <a:lnRef idx="2">
+              <a:schemeClr val="accent1">
+                <a:shade val="15000"/>
+              </a:schemeClr>
+            </a:lnRef>
+            <a:fillRef idx="1">
+              <a:schemeClr val="accent1"/>
+            </a:fillRef>
+            <a:effectRef idx="0">
+              <a:schemeClr val="accent1"/>
+            </a:effectRef>
+            <a:fontRef idx="minor">
+              <a:schemeClr val="lt1"/>
+            </a:fontRef>
+          </p:style>
+          <p:txBody>
+            <a:bodyPr rtlCol="0" anchor="ctr"/>
+            <a:lstStyle/>
+            <a:p>
+              <a:pPr algn="ctr"/>
+              <a:endParaRPr lang="en-GB"/>
+            </a:p>
+          </p:txBody>
+        </p:sp>
+        <p:sp>
+          <p:nvSpPr>
+            <p:cNvPr id="14" name="TextBox 13">
+              <a:extLst>
+                <a:ext uri="{FF2B5EF4-FFF2-40B4-BE49-F238E27FC236}">
+                  <a16:creationId xmlns:a16="http://schemas.microsoft.com/office/drawing/2014/main" id="{1ED4CE15-66D6-F5AE-47AA-27DEE8FE8998}"/>
+                </a:ext>
+              </a:extLst>
+            </p:cNvPr>
+            <p:cNvSpPr txBox="1"/>
+            <p:nvPr/>
+          </p:nvSpPr>
+          <p:spPr>
+            <a:xfrm>
+              <a:off x="0" y="7804414"/>
+              <a:ext cx="3972562" cy="387798"/>
+            </a:xfrm>
+            <a:prstGeom prst="rect">
+              <a:avLst/>
+            </a:prstGeom>
+            <a:grpFill/>
+            <a:ln w="41275">
+              <a:noFill/>
+            </a:ln>
+          </p:spPr>
+          <p:style>
+            <a:lnRef idx="2">
+              <a:schemeClr val="accent1">
+                <a:shade val="15000"/>
+              </a:schemeClr>
+            </a:lnRef>
+            <a:fillRef idx="1">
+              <a:schemeClr val="accent1"/>
+            </a:fillRef>
+            <a:effectRef idx="0">
+              <a:schemeClr val="accent1"/>
+            </a:effectRef>
+            <a:fontRef idx="minor">
+              <a:schemeClr val="lt1"/>
+            </a:fontRef>
+          </p:style>
+          <p:txBody>
+            <a:bodyPr rtlCol="0" anchor="ctr"/>
+            <a:lstStyle>
+              <a:defPPr>
+                <a:defRPr lang="en-US"/>
+              </a:defPPr>
+              <a:lvl1pPr algn="ctr">
+                <a:defRPr>
+                  <a:solidFill>
+                    <a:schemeClr val="lt1"/>
+                  </a:solidFill>
+                </a:defRPr>
+              </a:lvl1pPr>
+              <a:lvl2pPr>
+                <a:defRPr>
+                  <a:solidFill>
+                    <a:schemeClr val="lt1"/>
+                  </a:solidFill>
+                </a:defRPr>
+              </a:lvl2pPr>
+              <a:lvl3pPr>
+                <a:defRPr>
+                  <a:solidFill>
+                    <a:schemeClr val="lt1"/>
+                  </a:solidFill>
+                </a:defRPr>
+              </a:lvl3pPr>
+              <a:lvl4pPr>
+                <a:defRPr>
+                  <a:solidFill>
+                    <a:schemeClr val="lt1"/>
+                  </a:solidFill>
+                </a:defRPr>
+              </a:lvl4pPr>
+              <a:lvl5pPr>
+                <a:defRPr>
+                  <a:solidFill>
+                    <a:schemeClr val="lt1"/>
+                  </a:solidFill>
+                </a:defRPr>
+              </a:lvl5pPr>
+              <a:lvl6pPr>
+                <a:defRPr>
+                  <a:solidFill>
+                    <a:schemeClr val="lt1"/>
+                  </a:solidFill>
+                </a:defRPr>
+              </a:lvl6pPr>
+              <a:lvl7pPr>
+                <a:defRPr>
+                  <a:solidFill>
+                    <a:schemeClr val="lt1"/>
+                  </a:solidFill>
+                </a:defRPr>
+              </a:lvl7pPr>
+              <a:lvl8pPr>
+                <a:defRPr>
+                  <a:solidFill>
+                    <a:schemeClr val="lt1"/>
+                  </a:solidFill>
+                </a:defRPr>
+              </a:lvl8pPr>
+              <a:lvl9pPr>
+                <a:defRPr>
+                  <a:solidFill>
+                    <a:schemeClr val="lt1"/>
+                  </a:solidFill>
+                </a:defRPr>
+              </a:lvl9pPr>
+            </a:lstStyle>
+            <a:p>
+              <a:r>
+                <a:rPr lang="en-GB" dirty="0">
+                  <a:gradFill flip="none" rotWithShape="1">
+                    <a:gsLst>
+                      <a:gs pos="0">
+                        <a:schemeClr val="tx1">
+                          <a:lumMod val="50000"/>
+                          <a:lumOff val="50000"/>
+                        </a:schemeClr>
+                      </a:gs>
+                      <a:gs pos="74000">
+                        <a:schemeClr val="tx1">
+                          <a:lumMod val="50000"/>
+                          <a:lumOff val="50000"/>
+                        </a:schemeClr>
+                      </a:gs>
+                      <a:gs pos="83000">
+                        <a:schemeClr val="tx1">
+                          <a:lumMod val="65000"/>
+                          <a:lumOff val="35000"/>
+                        </a:schemeClr>
+                      </a:gs>
+                      <a:gs pos="100000">
+                        <a:schemeClr val="tx1">
+                          <a:lumMod val="75000"/>
+                          <a:lumOff val="25000"/>
+                        </a:schemeClr>
+                      </a:gs>
+                    </a:gsLst>
+                    <a:lin ang="0" scaled="1"/>
+                    <a:tileRect/>
+                  </a:gradFill>
+                </a:rPr>
+                <a:t>Tool Designed by Andrew Hubbard</a:t>
+              </a:r>
+            </a:p>
+          </p:txBody>
+        </p:sp>
+      </p:grpSp>
+      <p:sp>
+        <p:nvSpPr>
+          <p:cNvPr id="16" name="Rectangle 15">
+            <a:extLst>
+              <a:ext uri="{FF2B5EF4-FFF2-40B4-BE49-F238E27FC236}">
+                <a16:creationId xmlns:a16="http://schemas.microsoft.com/office/drawing/2014/main" id="{C253F666-D3E7-C2C0-C2A4-9147579CFE3B}"/>
+              </a:ext>
+            </a:extLst>
+          </p:cNvPr>
+          <p:cNvSpPr/>
+          <p:nvPr/>
+        </p:nvSpPr>
+        <p:spPr>
+          <a:xfrm rot="10800000">
+            <a:off x="-117232" y="-54863"/>
+            <a:ext cx="14816011" cy="609756"/>
+          </a:xfrm>
+          <a:prstGeom prst="rect">
+            <a:avLst/>
+          </a:prstGeom>
+          <a:solidFill>
+            <a:schemeClr val="bg1">
+              <a:lumMod val="95000"/>
+            </a:schemeClr>
+          </a:solidFill>
+          <a:ln w="41275">
+            <a:gradFill flip="none" rotWithShape="1">
+              <a:gsLst>
+                <a:gs pos="0">
+                  <a:schemeClr val="bg1">
+                    <a:lumMod val="65000"/>
+                  </a:schemeClr>
+                </a:gs>
+                <a:gs pos="74000">
+                  <a:schemeClr val="tx1">
+                    <a:lumMod val="50000"/>
+                    <a:lumOff val="50000"/>
+                  </a:schemeClr>
+                </a:gs>
+                <a:gs pos="83000">
+                  <a:schemeClr val="tx1">
+                    <a:lumMod val="65000"/>
+                    <a:lumOff val="35000"/>
+                  </a:schemeClr>
+                </a:gs>
+                <a:gs pos="100000">
+                  <a:schemeClr val="tx1">
+                    <a:lumMod val="85000"/>
+                    <a:lumOff val="15000"/>
+                  </a:schemeClr>
+                </a:gs>
+              </a:gsLst>
+              <a:lin ang="0" scaled="1"/>
+              <a:tileRect/>
+            </a:gradFill>
+          </a:ln>
+        </p:spPr>
+        <p:style>
+          <a:lnRef idx="2">
+            <a:schemeClr val="accent1">
+              <a:shade val="15000"/>
+            </a:schemeClr>
+          </a:lnRef>
+          <a:fillRef idx="1">
+            <a:schemeClr val="accent1"/>
+          </a:fillRef>
+          <a:effectRef idx="0">
+            <a:schemeClr val="accent1"/>
+          </a:effectRef>
+          <a:fontRef idx="minor">
+            <a:schemeClr val="lt1"/>
+          </a:fontRef>
+        </p:style>
+        <p:txBody>
+          <a:bodyPr rtlCol="0" anchor="ctr"/>
+          <a:lstStyle/>
+          <a:p>
+            <a:pPr algn="ctr"/>
+            <a:endParaRPr lang="en-GB"/>
+          </a:p>
+        </p:txBody>
+      </p:sp>
+      <p:sp>
+        <p:nvSpPr>
+          <p:cNvPr id="19" name="TextBox 18">
+            <a:extLst>
+              <a:ext uri="{FF2B5EF4-FFF2-40B4-BE49-F238E27FC236}">
+                <a16:creationId xmlns:a16="http://schemas.microsoft.com/office/drawing/2014/main" id="{A9648D06-6CC6-D014-9AFE-11BB0F809EA4}"/>
+              </a:ext>
+            </a:extLst>
+          </p:cNvPr>
+          <p:cNvSpPr txBox="1"/>
+          <p:nvPr/>
+        </p:nvSpPr>
+        <p:spPr>
+          <a:xfrm>
+            <a:off x="-60566" y="-27340"/>
+            <a:ext cx="14690965" cy="504079"/>
+          </a:xfrm>
+          <a:prstGeom prst="rect">
+            <a:avLst/>
+          </a:prstGeom>
+          <a:solidFill>
+            <a:schemeClr val="bg1">
+              <a:lumMod val="95000"/>
+            </a:schemeClr>
+          </a:solidFill>
+          <a:ln w="41275">
+            <a:noFill/>
+          </a:ln>
+        </p:spPr>
+        <p:style>
+          <a:lnRef idx="2">
+            <a:schemeClr val="accent1">
+              <a:shade val="15000"/>
+            </a:schemeClr>
+          </a:lnRef>
+          <a:fillRef idx="1">
+            <a:schemeClr val="accent1"/>
+          </a:fillRef>
+          <a:effectRef idx="0">
+            <a:schemeClr val="accent1"/>
+          </a:effectRef>
+          <a:fontRef idx="minor">
+            <a:schemeClr val="lt1"/>
+          </a:fontRef>
+        </p:style>
+        <p:txBody>
+          <a:bodyPr rtlCol="0" anchor="ctr"/>
+          <a:lstStyle>
+            <a:defPPr>
+              <a:defRPr lang="en-US"/>
+            </a:defPPr>
+            <a:lvl1pPr algn="ctr">
+              <a:defRPr>
+                <a:solidFill>
+                  <a:schemeClr val="lt1"/>
+                </a:solidFill>
+              </a:defRPr>
+            </a:lvl1pPr>
+            <a:lvl2pPr>
+              <a:defRPr>
+                <a:solidFill>
+                  <a:schemeClr val="lt1"/>
+                </a:solidFill>
+              </a:defRPr>
+            </a:lvl2pPr>
+            <a:lvl3pPr>
+              <a:defRPr>
+                <a:solidFill>
+                  <a:schemeClr val="lt1"/>
+                </a:solidFill>
+              </a:defRPr>
+            </a:lvl3pPr>
+            <a:lvl4pPr>
+              <a:defRPr>
+                <a:solidFill>
+                  <a:schemeClr val="lt1"/>
+                </a:solidFill>
+              </a:defRPr>
+            </a:lvl4pPr>
+            <a:lvl5pPr>
+              <a:defRPr>
+                <a:solidFill>
+                  <a:schemeClr val="lt1"/>
+                </a:solidFill>
+              </a:defRPr>
+            </a:lvl5pPr>
+            <a:lvl6pPr>
+              <a:defRPr>
+                <a:solidFill>
+                  <a:schemeClr val="lt1"/>
+                </a:solidFill>
+              </a:defRPr>
+            </a:lvl6pPr>
+            <a:lvl7pPr>
+              <a:defRPr>
+                <a:solidFill>
+                  <a:schemeClr val="lt1"/>
+                </a:solidFill>
+              </a:defRPr>
+            </a:lvl7pPr>
+            <a:lvl8pPr>
+              <a:defRPr>
+                <a:solidFill>
+                  <a:schemeClr val="lt1"/>
+                </a:solidFill>
+              </a:defRPr>
+            </a:lvl8pPr>
+            <a:lvl9pPr>
+              <a:defRPr>
+                <a:solidFill>
+                  <a:schemeClr val="lt1"/>
+                </a:solidFill>
+              </a:defRPr>
+            </a:lvl9pPr>
+          </a:lstStyle>
+          <a:p>
+            <a:r>
+              <a:rPr lang="en-GB" dirty="0">
+                <a:gradFill flip="none" rotWithShape="1">
+                  <a:gsLst>
+                    <a:gs pos="0">
+                      <a:schemeClr val="tx1">
+                        <a:lumMod val="50000"/>
+                        <a:lumOff val="50000"/>
+                      </a:schemeClr>
+                    </a:gs>
+                    <a:gs pos="74000">
+                      <a:schemeClr val="tx1">
+                        <a:lumMod val="50000"/>
+                        <a:lumOff val="50000"/>
+                      </a:schemeClr>
+                    </a:gs>
+                    <a:gs pos="83000">
+                      <a:schemeClr val="tx1">
+                        <a:lumMod val="65000"/>
+                        <a:lumOff val="35000"/>
+                      </a:schemeClr>
+                    </a:gs>
+                    <a:gs pos="100000">
+                      <a:schemeClr val="tx1">
+                        <a:lumMod val="75000"/>
+                        <a:lumOff val="25000"/>
+                      </a:schemeClr>
+                    </a:gs>
+                  </a:gsLst>
+                  <a:lin ang="0" scaled="1"/>
+                  <a:tileRect/>
+                </a:gradFill>
+              </a:rPr>
+              <a:t>Mainstreet Mercantile - Sales Analysis - 2024</a:t>
+            </a:r>
+          </a:p>
+        </p:txBody>
+      </p:sp>
+      <p:pic>
+        <p:nvPicPr>
+          <p:cNvPr id="27" name="Picture 26" descr="A circular picture of a building&#10;&#10;AI-generated content may be incorrect.">
+            <a:extLst>
+              <a:ext uri="{FF2B5EF4-FFF2-40B4-BE49-F238E27FC236}">
+                <a16:creationId xmlns:a16="http://schemas.microsoft.com/office/drawing/2014/main" id="{6F26DB23-E9B5-7FF8-FF28-95B73A4B3999}"/>
+              </a:ext>
+            </a:extLst>
+          </p:cNvPr>
+          <p:cNvPicPr>
+            <a:picLocks noChangeAspect="1"/>
+          </p:cNvPicPr>
+          <p:nvPr/>
+        </p:nvPicPr>
+        <p:blipFill>
+          <a:blip r:embed="rId3">
+            <a:extLst>
+              <a:ext uri="{28A0092B-C50C-407E-A947-70E740481C1C}">
+                <a14:useLocalDpi xmlns:a14="http://schemas.microsoft.com/office/drawing/2010/main" val="0"/>
+              </a:ext>
+            </a:extLst>
+          </a:blip>
+          <a:stretch>
+            <a:fillRect/>
+          </a:stretch>
+        </p:blipFill>
+        <p:spPr>
+          <a:xfrm>
+            <a:off x="14067693" y="-13716"/>
+            <a:ext cx="518743" cy="518743"/>
+          </a:xfrm>
+          <a:prstGeom prst="rect">
+            <a:avLst/>
+          </a:prstGeom>
+        </p:spPr>
+      </p:pic>
+      <p:grpSp>
+        <p:nvGrpSpPr>
+          <p:cNvPr id="28" name="Group 27">
+            <a:extLst>
+              <a:ext uri="{FF2B5EF4-FFF2-40B4-BE49-F238E27FC236}">
+                <a16:creationId xmlns:a16="http://schemas.microsoft.com/office/drawing/2014/main" id="{5CA5B84F-610C-D9B2-0546-77FADCC5A4B0}"/>
+              </a:ext>
+            </a:extLst>
+          </p:cNvPr>
+          <p:cNvGrpSpPr/>
+          <p:nvPr/>
+        </p:nvGrpSpPr>
+        <p:grpSpPr>
+          <a:xfrm>
+            <a:off x="-4114" y="633046"/>
+            <a:ext cx="823072" cy="6986956"/>
+            <a:chOff x="-349" y="1094155"/>
+            <a:chExt cx="764946" cy="6520147"/>
+          </a:xfrm>
+        </p:grpSpPr>
+        <p:sp>
+          <p:nvSpPr>
+            <p:cNvPr id="29" name="Rectangle: Rounded Corners 28">
+              <a:extLst>
+                <a:ext uri="{FF2B5EF4-FFF2-40B4-BE49-F238E27FC236}">
+                  <a16:creationId xmlns:a16="http://schemas.microsoft.com/office/drawing/2014/main" id="{CE58199A-CAEE-38FC-02EF-DE5A048D6E3B}"/>
+                </a:ext>
+              </a:extLst>
+            </p:cNvPr>
+            <p:cNvSpPr/>
+            <p:nvPr/>
+          </p:nvSpPr>
+          <p:spPr>
+            <a:xfrm>
+              <a:off x="-349" y="1094155"/>
+              <a:ext cx="764946" cy="6519828"/>
+            </a:xfrm>
+            <a:prstGeom prst="roundRect">
+              <a:avLst>
+                <a:gd name="adj" fmla="val 11559"/>
+              </a:avLst>
+            </a:prstGeom>
+            <a:solidFill>
+              <a:schemeClr val="bg1">
+                <a:lumMod val="95000"/>
+              </a:schemeClr>
+            </a:solidFill>
+            <a:ln w="41275">
+              <a:noFill/>
+            </a:ln>
+          </p:spPr>
+          <p:style>
+            <a:lnRef idx="2">
+              <a:schemeClr val="accent1">
+                <a:shade val="15000"/>
+              </a:schemeClr>
+            </a:lnRef>
+            <a:fillRef idx="1">
+              <a:schemeClr val="accent1"/>
+            </a:fillRef>
+            <a:effectRef idx="0">
+              <a:schemeClr val="accent1"/>
+            </a:effectRef>
+            <a:fontRef idx="minor">
+              <a:schemeClr val="lt1"/>
+            </a:fontRef>
+          </p:style>
+          <p:txBody>
+            <a:bodyPr rtlCol="0" anchor="ctr"/>
+            <a:lstStyle/>
+            <a:p>
+              <a:pPr algn="ctr"/>
+              <a:endParaRPr lang="en-GB" dirty="0">
+                <a:gradFill flip="none" rotWithShape="1">
+                  <a:gsLst>
+                    <a:gs pos="0">
+                      <a:schemeClr val="tx1">
+                        <a:lumMod val="50000"/>
+                        <a:lumOff val="50000"/>
+                      </a:schemeClr>
+                    </a:gs>
+                    <a:gs pos="74000">
+                      <a:schemeClr val="tx1">
+                        <a:lumMod val="50000"/>
+                        <a:lumOff val="50000"/>
+                      </a:schemeClr>
+                    </a:gs>
+                    <a:gs pos="83000">
+                      <a:schemeClr val="tx1">
+                        <a:lumMod val="65000"/>
+                        <a:lumOff val="35000"/>
+                      </a:schemeClr>
+                    </a:gs>
+                    <a:gs pos="100000">
+                      <a:schemeClr val="tx1">
+                        <a:lumMod val="75000"/>
+                        <a:lumOff val="25000"/>
+                      </a:schemeClr>
+                    </a:gs>
+                  </a:gsLst>
+                  <a:lin ang="0" scaled="1"/>
+                  <a:tileRect/>
+                </a:gradFill>
+              </a:endParaRPr>
+            </a:p>
+          </p:txBody>
+        </p:sp>
+        <p:sp>
+          <p:nvSpPr>
+            <p:cNvPr id="30" name="Rectangle 29">
+              <a:extLst>
+                <a:ext uri="{FF2B5EF4-FFF2-40B4-BE49-F238E27FC236}">
+                  <a16:creationId xmlns:a16="http://schemas.microsoft.com/office/drawing/2014/main" id="{976A2E2A-96E5-1D63-DDD7-670D401315DA}"/>
+                </a:ext>
+              </a:extLst>
+            </p:cNvPr>
+            <p:cNvSpPr/>
+            <p:nvPr/>
+          </p:nvSpPr>
+          <p:spPr>
+            <a:xfrm>
+              <a:off x="-349" y="1094474"/>
+              <a:ext cx="492718" cy="6519828"/>
+            </a:xfrm>
+            <a:prstGeom prst="rect">
+              <a:avLst/>
+            </a:prstGeom>
+            <a:solidFill>
+              <a:schemeClr val="bg1">
+                <a:lumMod val="95000"/>
+              </a:schemeClr>
+            </a:solidFill>
+            <a:ln w="41275">
+              <a:noFill/>
+            </a:ln>
+          </p:spPr>
+          <p:style>
+            <a:lnRef idx="2">
+              <a:schemeClr val="accent1">
+                <a:shade val="15000"/>
+              </a:schemeClr>
+            </a:lnRef>
+            <a:fillRef idx="1">
+              <a:schemeClr val="accent1"/>
+            </a:fillRef>
+            <a:effectRef idx="0">
+              <a:schemeClr val="accent1"/>
+            </a:effectRef>
+            <a:fontRef idx="minor">
+              <a:schemeClr val="lt1"/>
+            </a:fontRef>
+          </p:style>
+          <p:txBody>
+            <a:bodyPr rtlCol="0" anchor="ctr"/>
+            <a:lstStyle/>
+            <a:p>
+              <a:pPr algn="ctr"/>
+              <a:endParaRPr lang="en-GB">
+                <a:gradFill flip="none" rotWithShape="1">
+                  <a:gsLst>
+                    <a:gs pos="0">
+                      <a:schemeClr val="tx1">
+                        <a:lumMod val="50000"/>
+                        <a:lumOff val="50000"/>
+                      </a:schemeClr>
+                    </a:gs>
+                    <a:gs pos="74000">
+                      <a:schemeClr val="tx1">
+                        <a:lumMod val="50000"/>
+                        <a:lumOff val="50000"/>
+                      </a:schemeClr>
+                    </a:gs>
+                    <a:gs pos="83000">
+                      <a:schemeClr val="tx1">
+                        <a:lumMod val="65000"/>
+                        <a:lumOff val="35000"/>
+                      </a:schemeClr>
+                    </a:gs>
+                    <a:gs pos="100000">
+                      <a:schemeClr val="tx1">
+                        <a:lumMod val="75000"/>
+                        <a:lumOff val="25000"/>
+                      </a:schemeClr>
+                    </a:gs>
+                  </a:gsLst>
+                  <a:lin ang="0" scaled="1"/>
+                  <a:tileRect/>
+                </a:gradFill>
+              </a:endParaRPr>
+            </a:p>
+          </p:txBody>
+        </p:sp>
+      </p:grpSp>
+    </p:spTree>
+    <p:extLst>
+      <p:ext uri="{BB962C8B-B14F-4D97-AF65-F5344CB8AC3E}">
+        <p14:creationId xmlns:p14="http://schemas.microsoft.com/office/powerpoint/2010/main" val="4289022660"/>
+      </p:ext>
+    </p:extLst>
+  </p:cSld>
+  <p:clrMapOvr>
+    <a:masterClrMapping/>
+  </p:clrMapOvr>
+</p:sld>
+</file>
+
+<file path=ppt/slides/slide3.xml><?xml version="1.0" encoding="utf-8"?>
 <p:sld xmlns:a="http://schemas.openxmlformats.org/drawingml/2006/main" xmlns:r="http://schemas.openxmlformats.org/officeDocument/2006/relationships" xmlns:p="http://schemas.openxmlformats.org/presentationml/2006/main">
   <p:cSld>
     <p:spTree>
@@ -5753,7 +6355,7 @@
 </p:sld>
 </file>
 
-<file path=ppt/slides/slide3.xml><?xml version="1.0" encoding="utf-8"?>
+<file path=ppt/slides/slide4.xml><?xml version="1.0" encoding="utf-8"?>
 <p:sld xmlns:a="http://schemas.openxmlformats.org/drawingml/2006/main" xmlns:r="http://schemas.openxmlformats.org/officeDocument/2006/relationships" xmlns:p="http://schemas.openxmlformats.org/presentationml/2006/main">
   <p:cSld>
     <p:spTree>

</xml_diff>

<commit_message>
Added New Pricing Background & Updated Report File
</commit_message>
<xml_diff>
--- a/Assets/Backgrounds/Demand Background.pptx
+++ b/Assets/Backgrounds/Demand Background.pptx
@@ -5,13 +5,14 @@
     <p:sldMasterId id="2147483660" r:id="rId1"/>
   </p:sldMasterIdLst>
   <p:notesMasterIdLst>
-    <p:notesMasterId r:id="rId6"/>
+    <p:notesMasterId r:id="rId7"/>
   </p:notesMasterIdLst>
   <p:sldIdLst>
     <p:sldId id="256" r:id="rId2"/>
     <p:sldId id="270" r:id="rId3"/>
-    <p:sldId id="260" r:id="rId4"/>
-    <p:sldId id="269" r:id="rId5"/>
+    <p:sldId id="271" r:id="rId4"/>
+    <p:sldId id="260" r:id="rId5"/>
+    <p:sldId id="269" r:id="rId6"/>
   </p:sldIdLst>
   <p:sldSz cx="14630400" cy="8229600"/>
   <p:notesSz cx="6858000" cy="9144000"/>
@@ -132,7 +133,7 @@
 <file path=ppt/revisionInfo.xml><?xml version="1.0" encoding="utf-8"?>
 <p1510:revInfo xmlns:a="http://schemas.openxmlformats.org/drawingml/2006/main" xmlns:r="http://schemas.openxmlformats.org/officeDocument/2006/relationships" xmlns:p1510="http://schemas.microsoft.com/office/powerpoint/2015/10/main">
   <p1510:revLst>
-    <p1510:client id="{73EF7C00-CEA6-417E-9225-931A981C833B}" v="59" dt="2025-04-13T07:01:34.519"/>
+    <p1510:client id="{73EF7C00-CEA6-417E-9225-931A981C833B}" v="70" dt="2025-04-18T10:09:59.030"/>
   </p1510:revLst>
 </p1510:revInfo>
 </file>
@@ -142,7 +143,7 @@
   <pc:docChgLst>
     <pc:chgData name="Andrew" userId="36c5b73e-58a9-45e0-b191-7481baa14d1c" providerId="ADAL" clId="{73EF7C00-CEA6-417E-9225-931A981C833B}"/>
     <pc:docChg chg="undo custSel addSld delSld modSld">
-      <pc:chgData name="Andrew" userId="36c5b73e-58a9-45e0-b191-7481baa14d1c" providerId="ADAL" clId="{73EF7C00-CEA6-417E-9225-931A981C833B}" dt="2025-04-13T07:00:43.289" v="406" actId="478"/>
+      <pc:chgData name="Andrew" userId="36c5b73e-58a9-45e0-b191-7481baa14d1c" providerId="ADAL" clId="{73EF7C00-CEA6-417E-9225-931A981C833B}" dt="2025-04-18T10:11:10.150" v="465" actId="14100"/>
       <pc:docMkLst>
         <pc:docMk/>
       </pc:docMkLst>
@@ -152,22 +153,6 @@
           <pc:docMk/>
           <pc:sldMk cId="3915621456" sldId="256"/>
         </pc:sldMkLst>
-        <pc:spChg chg="add del mod">
-          <ac:chgData name="Andrew" userId="36c5b73e-58a9-45e0-b191-7481baa14d1c" providerId="ADAL" clId="{73EF7C00-CEA6-417E-9225-931A981C833B}" dt="2025-04-12T08:09:16.860" v="358" actId="478"/>
-          <ac:spMkLst>
-            <pc:docMk/>
-            <pc:sldMk cId="3915621456" sldId="256"/>
-            <ac:spMk id="2" creationId="{2386C1B1-419C-27E0-1DED-D41823642EBE}"/>
-          </ac:spMkLst>
-        </pc:spChg>
-        <pc:spChg chg="add del mod">
-          <ac:chgData name="Andrew" userId="36c5b73e-58a9-45e0-b191-7481baa14d1c" providerId="ADAL" clId="{73EF7C00-CEA6-417E-9225-931A981C833B}" dt="2025-04-12T08:12:18.407" v="388" actId="478"/>
-          <ac:spMkLst>
-            <pc:docMk/>
-            <pc:sldMk cId="3915621456" sldId="256"/>
-            <ac:spMk id="3" creationId="{1E5B55D1-9FC1-438B-BAF7-907F32C4A423}"/>
-          </ac:spMkLst>
-        </pc:spChg>
         <pc:spChg chg="add mod">
           <ac:chgData name="Andrew" userId="36c5b73e-58a9-45e0-b191-7481baa14d1c" providerId="ADAL" clId="{73EF7C00-CEA6-417E-9225-931A981C833B}" dt="2025-04-12T08:12:42.934" v="390" actId="408"/>
           <ac:spMkLst>
@@ -182,22 +167,6 @@
             <pc:docMk/>
             <pc:sldMk cId="3915621456" sldId="256"/>
             <ac:spMk id="6" creationId="{FA73749B-981F-FF20-7305-3D9C9B574609}"/>
-          </ac:spMkLst>
-        </pc:spChg>
-        <pc:spChg chg="del mod">
-          <ac:chgData name="Andrew" userId="36c5b73e-58a9-45e0-b191-7481baa14d1c" providerId="ADAL" clId="{73EF7C00-CEA6-417E-9225-931A981C833B}" dt="2025-04-12T08:11:01.442" v="375" actId="478"/>
-          <ac:spMkLst>
-            <pc:docMk/>
-            <pc:sldMk cId="3915621456" sldId="256"/>
-            <ac:spMk id="7" creationId="{39F3ADE7-7377-91F5-ACF2-381BEDFADBFE}"/>
-          </ac:spMkLst>
-        </pc:spChg>
-        <pc:spChg chg="del mod">
-          <ac:chgData name="Andrew" userId="36c5b73e-58a9-45e0-b191-7481baa14d1c" providerId="ADAL" clId="{73EF7C00-CEA6-417E-9225-931A981C833B}" dt="2025-04-12T08:10:52.467" v="373" actId="478"/>
-          <ac:spMkLst>
-            <pc:docMk/>
-            <pc:sldMk cId="3915621456" sldId="256"/>
-            <ac:spMk id="8" creationId="{23047E59-E47E-DC29-CA7C-F86657A7CA2F}"/>
           </ac:spMkLst>
         </pc:spChg>
         <pc:spChg chg="mod">
@@ -246,14 +215,6 @@
             <pc:docMk/>
             <pc:sldMk cId="3915621456" sldId="256"/>
             <ac:spMk id="16" creationId="{908496E2-72C3-206E-953B-ACA11BFDA1DD}"/>
-          </ac:spMkLst>
-        </pc:spChg>
-        <pc:spChg chg="add del mod">
-          <ac:chgData name="Andrew" userId="36c5b73e-58a9-45e0-b191-7481baa14d1c" providerId="ADAL" clId="{73EF7C00-CEA6-417E-9225-931A981C833B}" dt="2025-04-12T07:59:00.762" v="321" actId="478"/>
-          <ac:spMkLst>
-            <pc:docMk/>
-            <pc:sldMk cId="3915621456" sldId="256"/>
-            <ac:spMk id="18" creationId="{412908FA-8F92-9085-0A14-BC5E765F0BC0}"/>
           </ac:spMkLst>
         </pc:spChg>
         <pc:spChg chg="add mod ord">
@@ -398,52 +359,115 @@
           <pc:sldMk cId="520420066" sldId="270"/>
         </pc:sldMkLst>
       </pc:sldChg>
-      <pc:sldChg chg="delSp add mod">
-        <pc:chgData name="Andrew" userId="36c5b73e-58a9-45e0-b191-7481baa14d1c" providerId="ADAL" clId="{73EF7C00-CEA6-417E-9225-931A981C833B}" dt="2025-04-13T07:00:43.289" v="406" actId="478"/>
+      <pc:sldChg chg="addSp delSp modSp add mod">
+        <pc:chgData name="Andrew" userId="36c5b73e-58a9-45e0-b191-7481baa14d1c" providerId="ADAL" clId="{73EF7C00-CEA6-417E-9225-931A981C833B}" dt="2025-04-18T10:11:10.150" v="465" actId="14100"/>
         <pc:sldMkLst>
           <pc:docMk/>
           <pc:sldMk cId="4289022660" sldId="270"/>
         </pc:sldMkLst>
-        <pc:spChg chg="del">
-          <ac:chgData name="Andrew" userId="36c5b73e-58a9-45e0-b191-7481baa14d1c" providerId="ADAL" clId="{73EF7C00-CEA6-417E-9225-931A981C833B}" dt="2025-04-13T07:00:41.527" v="404" actId="478"/>
+        <pc:spChg chg="add mod">
+          <ac:chgData name="Andrew" userId="36c5b73e-58a9-45e0-b191-7481baa14d1c" providerId="ADAL" clId="{73EF7C00-CEA6-417E-9225-931A981C833B}" dt="2025-04-18T10:09:27.357" v="452" actId="552"/>
           <ac:spMkLst>
             <pc:docMk/>
             <pc:sldMk cId="4289022660" sldId="270"/>
-            <ac:spMk id="4" creationId="{786DBC1C-A267-74B0-037A-C82A6CB0EA5E}"/>
+            <ac:spMk id="4" creationId="{ADFAE6C5-4C38-B199-4C3C-43770762B83D}"/>
           </ac:spMkLst>
         </pc:spChg>
-        <pc:spChg chg="del">
-          <ac:chgData name="Andrew" userId="36c5b73e-58a9-45e0-b191-7481baa14d1c" providerId="ADAL" clId="{73EF7C00-CEA6-417E-9225-931A981C833B}" dt="2025-04-13T07:00:39.805" v="402" actId="478"/>
+        <pc:spChg chg="add mod">
+          <ac:chgData name="Andrew" userId="36c5b73e-58a9-45e0-b191-7481baa14d1c" providerId="ADAL" clId="{73EF7C00-CEA6-417E-9225-931A981C833B}" dt="2025-04-18T10:06:51.296" v="434" actId="14100"/>
           <ac:spMkLst>
             <pc:docMk/>
             <pc:sldMk cId="4289022660" sldId="270"/>
-            <ac:spMk id="6" creationId="{07E74311-0901-DE2E-E67A-3BBB0317DCB1}"/>
+            <ac:spMk id="6" creationId="{781D28FD-C34D-7CFE-98E3-7DEB545EAAC4}"/>
           </ac:spMkLst>
         </pc:spChg>
-        <pc:spChg chg="del">
-          <ac:chgData name="Andrew" userId="36c5b73e-58a9-45e0-b191-7481baa14d1c" providerId="ADAL" clId="{73EF7C00-CEA6-417E-9225-931A981C833B}" dt="2025-04-13T07:00:40.745" v="403" actId="478"/>
+        <pc:spChg chg="add mod">
+          <ac:chgData name="Andrew" userId="36c5b73e-58a9-45e0-b191-7481baa14d1c" providerId="ADAL" clId="{73EF7C00-CEA6-417E-9225-931A981C833B}" dt="2025-04-18T10:06:23.670" v="432" actId="408"/>
           <ac:spMkLst>
             <pc:docMk/>
             <pc:sldMk cId="4289022660" sldId="270"/>
-            <ac:spMk id="9" creationId="{D342E7EA-6C79-1BFA-CB3E-8CF5F1CD5244}"/>
+            <ac:spMk id="7" creationId="{5E54119E-9B24-157B-C528-894AE18C3B19}"/>
           </ac:spMkLst>
         </pc:spChg>
-        <pc:spChg chg="del">
-          <ac:chgData name="Andrew" userId="36c5b73e-58a9-45e0-b191-7481baa14d1c" providerId="ADAL" clId="{73EF7C00-CEA6-417E-9225-931A981C833B}" dt="2025-04-13T07:00:43.289" v="406" actId="478"/>
+        <pc:spChg chg="add mod">
+          <ac:chgData name="Andrew" userId="36c5b73e-58a9-45e0-b191-7481baa14d1c" providerId="ADAL" clId="{73EF7C00-CEA6-417E-9225-931A981C833B}" dt="2025-04-18T10:09:17.190" v="451" actId="553"/>
           <ac:spMkLst>
             <pc:docMk/>
             <pc:sldMk cId="4289022660" sldId="270"/>
-            <ac:spMk id="10" creationId="{9FBBAC05-CF76-433F-C08B-6D24268CA189}"/>
+            <ac:spMk id="8" creationId="{B3EF6442-BF16-9DFE-986E-2EE55B5683BB}"/>
           </ac:spMkLst>
         </pc:spChg>
-        <pc:spChg chg="del">
-          <ac:chgData name="Andrew" userId="36c5b73e-58a9-45e0-b191-7481baa14d1c" providerId="ADAL" clId="{73EF7C00-CEA6-417E-9225-931A981C833B}" dt="2025-04-13T07:00:42.232" v="405" actId="478"/>
+        <pc:spChg chg="add mod">
+          <ac:chgData name="Andrew" userId="36c5b73e-58a9-45e0-b191-7481baa14d1c" providerId="ADAL" clId="{73EF7C00-CEA6-417E-9225-931A981C833B}" dt="2025-04-18T10:09:38.583" v="454" actId="408"/>
           <ac:spMkLst>
             <pc:docMk/>
             <pc:sldMk cId="4289022660" sldId="270"/>
-            <ac:spMk id="11" creationId="{7A89D8F4-E238-53C7-A228-CD9B676515E1}"/>
+            <ac:spMk id="9" creationId="{7540F57C-B207-8355-3B1B-5A7AF6E186E7}"/>
           </ac:spMkLst>
         </pc:spChg>
+        <pc:spChg chg="add mod">
+          <ac:chgData name="Andrew" userId="36c5b73e-58a9-45e0-b191-7481baa14d1c" providerId="ADAL" clId="{73EF7C00-CEA6-417E-9225-931A981C833B}" dt="2025-04-18T10:09:46.008" v="455" actId="408"/>
+          <ac:spMkLst>
+            <pc:docMk/>
+            <pc:sldMk cId="4289022660" sldId="270"/>
+            <ac:spMk id="10" creationId="{7D01CB58-28A4-85AC-774E-9BDF32DD0DF0}"/>
+          </ac:spMkLst>
+        </pc:spChg>
+        <pc:spChg chg="add mod">
+          <ac:chgData name="Andrew" userId="36c5b73e-58a9-45e0-b191-7481baa14d1c" providerId="ADAL" clId="{73EF7C00-CEA6-417E-9225-931A981C833B}" dt="2025-04-18T10:09:17.190" v="451" actId="553"/>
+          <ac:spMkLst>
+            <pc:docMk/>
+            <pc:sldMk cId="4289022660" sldId="270"/>
+            <ac:spMk id="11" creationId="{E3187489-A794-EB9F-3C90-AF595DC2571D}"/>
+          </ac:spMkLst>
+        </pc:spChg>
+        <pc:spChg chg="add mod">
+          <ac:chgData name="Andrew" userId="36c5b73e-58a9-45e0-b191-7481baa14d1c" providerId="ADAL" clId="{73EF7C00-CEA6-417E-9225-931A981C833B}" dt="2025-04-18T10:09:50.712" v="456"/>
+          <ac:spMkLst>
+            <pc:docMk/>
+            <pc:sldMk cId="4289022660" sldId="270"/>
+            <ac:spMk id="15" creationId="{FDDFA7D4-150E-41F7-8931-80105FD0BF35}"/>
+          </ac:spMkLst>
+        </pc:spChg>
+        <pc:spChg chg="add mod">
+          <ac:chgData name="Andrew" userId="36c5b73e-58a9-45e0-b191-7481baa14d1c" providerId="ADAL" clId="{73EF7C00-CEA6-417E-9225-931A981C833B}" dt="2025-04-18T10:09:50.712" v="456"/>
+          <ac:spMkLst>
+            <pc:docMk/>
+            <pc:sldMk cId="4289022660" sldId="270"/>
+            <ac:spMk id="17" creationId="{782DE32E-334C-DD9D-3149-EDAEF26C3D99}"/>
+          </ac:spMkLst>
+        </pc:spChg>
+        <pc:spChg chg="add mod">
+          <ac:chgData name="Andrew" userId="36c5b73e-58a9-45e0-b191-7481baa14d1c" providerId="ADAL" clId="{73EF7C00-CEA6-417E-9225-931A981C833B}" dt="2025-04-18T10:09:50.712" v="456"/>
+          <ac:spMkLst>
+            <pc:docMk/>
+            <pc:sldMk cId="4289022660" sldId="270"/>
+            <ac:spMk id="18" creationId="{916F379F-0F81-A948-C420-BBA45E24B239}"/>
+          </ac:spMkLst>
+        </pc:spChg>
+        <pc:spChg chg="add mod">
+          <ac:chgData name="Andrew" userId="36c5b73e-58a9-45e0-b191-7481baa14d1c" providerId="ADAL" clId="{73EF7C00-CEA6-417E-9225-931A981C833B}" dt="2025-04-18T10:11:10.150" v="465" actId="14100"/>
+          <ac:spMkLst>
+            <pc:docMk/>
+            <pc:sldMk cId="4289022660" sldId="270"/>
+            <ac:spMk id="20" creationId="{DE1CE4F0-9ACF-C0A2-2F1D-473D3FCBD535}"/>
+          </ac:spMkLst>
+        </pc:spChg>
+        <pc:picChg chg="add mod modVis">
+          <ac:chgData name="Andrew" userId="36c5b73e-58a9-45e0-b191-7481baa14d1c" providerId="ADAL" clId="{73EF7C00-CEA6-417E-9225-931A981C833B}" dt="2025-04-18T10:10:32.917" v="463" actId="14430"/>
+          <ac:picMkLst>
+            <pc:docMk/>
+            <pc:sldMk cId="4289022660" sldId="270"/>
+            <ac:picMk id="3" creationId="{96B02265-D940-5CA2-041A-883F61421A2A}"/>
+          </ac:picMkLst>
+        </pc:picChg>
+      </pc:sldChg>
+      <pc:sldChg chg="add">
+        <pc:chgData name="Andrew" userId="36c5b73e-58a9-45e0-b191-7481baa14d1c" providerId="ADAL" clId="{73EF7C00-CEA6-417E-9225-931A981C833B}" dt="2025-04-18T10:04:03.424" v="407" actId="2890"/>
+        <pc:sldMkLst>
+          <pc:docMk/>
+          <pc:sldMk cId="2069518278" sldId="271"/>
+        </pc:sldMkLst>
       </pc:sldChg>
     </pc:docChg>
   </pc:docChgLst>
@@ -532,7 +556,7 @@
           <a:p>
             <a:fld id="{4CF10B02-57E9-42D5-8D07-6EFA539A5EF5}" type="datetimeFigureOut">
               <a:rPr lang="en-GB" smtClean="0"/>
-              <a:t>13/04/2025</a:t>
+              <a:t>18/04/2025</a:t>
             </a:fld>
             <a:endParaRPr lang="en-GB"/>
           </a:p>
@@ -865,7 +889,7 @@
           <a:p>
             <a:fld id="{7070B6CD-3126-4638-AAB2-C888F006EC93}" type="slidenum">
               <a:rPr lang="en-GB" smtClean="0"/>
-              <a:t>4</a:t>
+              <a:t>5</a:t>
             </a:fld>
             <a:endParaRPr lang="en-GB"/>
           </a:p>
@@ -1015,7 +1039,7 @@
           <a:p>
             <a:fld id="{BAECE617-0988-4F0C-938E-A811736645F6}" type="datetimeFigureOut">
               <a:rPr lang="en-GB" smtClean="0"/>
-              <a:t>13/04/2025</a:t>
+              <a:t>18/04/2025</a:t>
             </a:fld>
             <a:endParaRPr lang="en-GB"/>
           </a:p>
@@ -1185,7 +1209,7 @@
           <a:p>
             <a:fld id="{BAECE617-0988-4F0C-938E-A811736645F6}" type="datetimeFigureOut">
               <a:rPr lang="en-GB" smtClean="0"/>
-              <a:t>13/04/2025</a:t>
+              <a:t>18/04/2025</a:t>
             </a:fld>
             <a:endParaRPr lang="en-GB"/>
           </a:p>
@@ -1365,7 +1389,7 @@
           <a:p>
             <a:fld id="{BAECE617-0988-4F0C-938E-A811736645F6}" type="datetimeFigureOut">
               <a:rPr lang="en-GB" smtClean="0"/>
-              <a:t>13/04/2025</a:t>
+              <a:t>18/04/2025</a:t>
             </a:fld>
             <a:endParaRPr lang="en-GB"/>
           </a:p>
@@ -1535,7 +1559,7 @@
           <a:p>
             <a:fld id="{BAECE617-0988-4F0C-938E-A811736645F6}" type="datetimeFigureOut">
               <a:rPr lang="en-GB" smtClean="0"/>
-              <a:t>13/04/2025</a:t>
+              <a:t>18/04/2025</a:t>
             </a:fld>
             <a:endParaRPr lang="en-GB"/>
           </a:p>
@@ -1781,7 +1805,7 @@
           <a:p>
             <a:fld id="{BAECE617-0988-4F0C-938E-A811736645F6}" type="datetimeFigureOut">
               <a:rPr lang="en-GB" smtClean="0"/>
-              <a:t>13/04/2025</a:t>
+              <a:t>18/04/2025</a:t>
             </a:fld>
             <a:endParaRPr lang="en-GB"/>
           </a:p>
@@ -2013,7 +2037,7 @@
           <a:p>
             <a:fld id="{BAECE617-0988-4F0C-938E-A811736645F6}" type="datetimeFigureOut">
               <a:rPr lang="en-GB" smtClean="0"/>
-              <a:t>13/04/2025</a:t>
+              <a:t>18/04/2025</a:t>
             </a:fld>
             <a:endParaRPr lang="en-GB"/>
           </a:p>
@@ -2380,7 +2404,7 @@
           <a:p>
             <a:fld id="{BAECE617-0988-4F0C-938E-A811736645F6}" type="datetimeFigureOut">
               <a:rPr lang="en-GB" smtClean="0"/>
-              <a:t>13/04/2025</a:t>
+              <a:t>18/04/2025</a:t>
             </a:fld>
             <a:endParaRPr lang="en-GB"/>
           </a:p>
@@ -2498,7 +2522,7 @@
           <a:p>
             <a:fld id="{BAECE617-0988-4F0C-938E-A811736645F6}" type="datetimeFigureOut">
               <a:rPr lang="en-GB" smtClean="0"/>
-              <a:t>13/04/2025</a:t>
+              <a:t>18/04/2025</a:t>
             </a:fld>
             <a:endParaRPr lang="en-GB"/>
           </a:p>
@@ -2593,7 +2617,7 @@
           <a:p>
             <a:fld id="{BAECE617-0988-4F0C-938E-A811736645F6}" type="datetimeFigureOut">
               <a:rPr lang="en-GB" smtClean="0"/>
-              <a:t>13/04/2025</a:t>
+              <a:t>18/04/2025</a:t>
             </a:fld>
             <a:endParaRPr lang="en-GB"/>
           </a:p>
@@ -2870,7 +2894,7 @@
           <a:p>
             <a:fld id="{BAECE617-0988-4F0C-938E-A811736645F6}" type="datetimeFigureOut">
               <a:rPr lang="en-GB" smtClean="0"/>
-              <a:t>13/04/2025</a:t>
+              <a:t>18/04/2025</a:t>
             </a:fld>
             <a:endParaRPr lang="en-GB"/>
           </a:p>
@@ -3127,7 +3151,7 @@
           <a:p>
             <a:fld id="{BAECE617-0988-4F0C-938E-A811736645F6}" type="datetimeFigureOut">
               <a:rPr lang="en-GB" smtClean="0"/>
-              <a:t>13/04/2025</a:t>
+              <a:t>18/04/2025</a:t>
             </a:fld>
             <a:endParaRPr lang="en-GB"/>
           </a:p>
@@ -3340,7 +3364,7 @@
           <a:p>
             <a:fld id="{BAECE617-0988-4F0C-938E-A811736645F6}" type="datetimeFigureOut">
               <a:rPr lang="en-GB" smtClean="0"/>
-              <a:t>13/04/2025</a:t>
+              <a:t>18/04/2025</a:t>
             </a:fld>
             <a:endParaRPr lang="en-GB"/>
           </a:p>
@@ -5581,6 +5605,474 @@
           </p:txBody>
         </p:sp>
       </p:grpSp>
+      <p:pic>
+        <p:nvPicPr>
+          <p:cNvPr id="3" name="Picture 2" descr="A screenshot of a computer&#10;&#10;AI-generated content may be incorrect." hidden="1">
+            <a:extLst>
+              <a:ext uri="{FF2B5EF4-FFF2-40B4-BE49-F238E27FC236}">
+                <a16:creationId xmlns:a16="http://schemas.microsoft.com/office/drawing/2014/main" id="{96B02265-D940-5CA2-041A-883F61421A2A}"/>
+              </a:ext>
+            </a:extLst>
+          </p:cNvPr>
+          <p:cNvPicPr>
+            <a:picLocks noChangeAspect="1"/>
+          </p:cNvPicPr>
+          <p:nvPr/>
+        </p:nvPicPr>
+        <p:blipFill>
+          <a:blip r:embed="rId4">
+            <a:extLst>
+              <a:ext uri="{28A0092B-C50C-407E-A947-70E740481C1C}">
+                <a14:useLocalDpi xmlns:a14="http://schemas.microsoft.com/office/drawing/2010/main" val="0"/>
+              </a:ext>
+            </a:extLst>
+          </a:blip>
+          <a:stretch>
+            <a:fillRect/>
+          </a:stretch>
+        </p:blipFill>
+        <p:spPr>
+          <a:xfrm>
+            <a:off x="0" y="7570"/>
+            <a:ext cx="14630400" cy="8214459"/>
+          </a:xfrm>
+          <a:prstGeom prst="rect">
+            <a:avLst/>
+          </a:prstGeom>
+        </p:spPr>
+      </p:pic>
+      <p:sp>
+        <p:nvSpPr>
+          <p:cNvPr id="4" name="Rectangle: Rounded Corners 3">
+            <a:extLst>
+              <a:ext uri="{FF2B5EF4-FFF2-40B4-BE49-F238E27FC236}">
+                <a16:creationId xmlns:a16="http://schemas.microsoft.com/office/drawing/2014/main" id="{ADFAE6C5-4C38-B199-4C3C-43770762B83D}"/>
+              </a:ext>
+            </a:extLst>
+          </p:cNvPr>
+          <p:cNvSpPr/>
+          <p:nvPr/>
+        </p:nvSpPr>
+        <p:spPr>
+          <a:xfrm>
+            <a:off x="1040576" y="914400"/>
+            <a:ext cx="3284540" cy="2633783"/>
+          </a:xfrm>
+          <a:prstGeom prst="roundRect">
+            <a:avLst>
+              <a:gd name="adj" fmla="val 4048"/>
+            </a:avLst>
+          </a:prstGeom>
+          <a:solidFill>
+            <a:schemeClr val="bg1"/>
+          </a:solidFill>
+          <a:ln>
+            <a:noFill/>
+          </a:ln>
+        </p:spPr>
+        <p:style>
+          <a:lnRef idx="2">
+            <a:schemeClr val="accent1">
+              <a:shade val="15000"/>
+            </a:schemeClr>
+          </a:lnRef>
+          <a:fillRef idx="1">
+            <a:schemeClr val="accent1"/>
+          </a:fillRef>
+          <a:effectRef idx="0">
+            <a:schemeClr val="accent1"/>
+          </a:effectRef>
+          <a:fontRef idx="minor">
+            <a:schemeClr val="lt1"/>
+          </a:fontRef>
+        </p:style>
+        <p:txBody>
+          <a:bodyPr rtlCol="0" anchor="ctr"/>
+          <a:lstStyle/>
+          <a:p>
+            <a:pPr algn="ctr"/>
+            <a:endParaRPr lang="en-GB"/>
+          </a:p>
+        </p:txBody>
+      </p:sp>
+      <p:sp>
+        <p:nvSpPr>
+          <p:cNvPr id="6" name="Rectangle: Rounded Corners 5">
+            <a:extLst>
+              <a:ext uri="{FF2B5EF4-FFF2-40B4-BE49-F238E27FC236}">
+                <a16:creationId xmlns:a16="http://schemas.microsoft.com/office/drawing/2014/main" id="{781D28FD-C34D-7CFE-98E3-7DEB545EAAC4}"/>
+              </a:ext>
+            </a:extLst>
+          </p:cNvPr>
+          <p:cNvSpPr/>
+          <p:nvPr/>
+        </p:nvSpPr>
+        <p:spPr>
+          <a:xfrm>
+            <a:off x="4738910" y="914400"/>
+            <a:ext cx="3284539" cy="2633783"/>
+          </a:xfrm>
+          <a:prstGeom prst="roundRect">
+            <a:avLst>
+              <a:gd name="adj" fmla="val 4048"/>
+            </a:avLst>
+          </a:prstGeom>
+          <a:solidFill>
+            <a:schemeClr val="bg1"/>
+          </a:solidFill>
+          <a:ln>
+            <a:noFill/>
+          </a:ln>
+        </p:spPr>
+        <p:style>
+          <a:lnRef idx="2">
+            <a:schemeClr val="accent1">
+              <a:shade val="15000"/>
+            </a:schemeClr>
+          </a:lnRef>
+          <a:fillRef idx="1">
+            <a:schemeClr val="accent1"/>
+          </a:fillRef>
+          <a:effectRef idx="0">
+            <a:schemeClr val="accent1"/>
+          </a:effectRef>
+          <a:fontRef idx="minor">
+            <a:schemeClr val="lt1"/>
+          </a:fontRef>
+        </p:style>
+        <p:txBody>
+          <a:bodyPr rtlCol="0" anchor="ctr"/>
+          <a:lstStyle/>
+          <a:p>
+            <a:pPr algn="ctr"/>
+            <a:endParaRPr lang="en-GB"/>
+          </a:p>
+        </p:txBody>
+      </p:sp>
+      <p:sp>
+        <p:nvSpPr>
+          <p:cNvPr id="7" name="Rectangle: Rounded Corners 6">
+            <a:extLst>
+              <a:ext uri="{FF2B5EF4-FFF2-40B4-BE49-F238E27FC236}">
+                <a16:creationId xmlns:a16="http://schemas.microsoft.com/office/drawing/2014/main" id="{5E54119E-9B24-157B-C528-894AE18C3B19}"/>
+              </a:ext>
+            </a:extLst>
+          </p:cNvPr>
+          <p:cNvSpPr/>
+          <p:nvPr/>
+        </p:nvSpPr>
+        <p:spPr>
+          <a:xfrm>
+            <a:off x="8245067" y="914399"/>
+            <a:ext cx="2984686" cy="2633785"/>
+          </a:xfrm>
+          <a:prstGeom prst="roundRect">
+            <a:avLst>
+              <a:gd name="adj" fmla="val 4048"/>
+            </a:avLst>
+          </a:prstGeom>
+          <a:solidFill>
+            <a:schemeClr val="bg1"/>
+          </a:solidFill>
+          <a:ln>
+            <a:noFill/>
+          </a:ln>
+        </p:spPr>
+        <p:style>
+          <a:lnRef idx="2">
+            <a:schemeClr val="accent1">
+              <a:shade val="15000"/>
+            </a:schemeClr>
+          </a:lnRef>
+          <a:fillRef idx="1">
+            <a:schemeClr val="accent1"/>
+          </a:fillRef>
+          <a:effectRef idx="0">
+            <a:schemeClr val="accent1"/>
+          </a:effectRef>
+          <a:fontRef idx="minor">
+            <a:schemeClr val="lt1"/>
+          </a:fontRef>
+        </p:style>
+        <p:txBody>
+          <a:bodyPr rtlCol="0" anchor="ctr"/>
+          <a:lstStyle/>
+          <a:p>
+            <a:pPr algn="ctr"/>
+            <a:endParaRPr lang="en-GB"/>
+          </a:p>
+        </p:txBody>
+      </p:sp>
+      <p:sp>
+        <p:nvSpPr>
+          <p:cNvPr id="8" name="Rectangle: Rounded Corners 7">
+            <a:extLst>
+              <a:ext uri="{FF2B5EF4-FFF2-40B4-BE49-F238E27FC236}">
+                <a16:creationId xmlns:a16="http://schemas.microsoft.com/office/drawing/2014/main" id="{B3EF6442-BF16-9DFE-986E-2EE55B5683BB}"/>
+              </a:ext>
+            </a:extLst>
+          </p:cNvPr>
+          <p:cNvSpPr/>
+          <p:nvPr/>
+        </p:nvSpPr>
+        <p:spPr>
+          <a:xfrm>
+            <a:off x="11451371" y="914398"/>
+            <a:ext cx="2984686" cy="2633785"/>
+          </a:xfrm>
+          <a:prstGeom prst="roundRect">
+            <a:avLst>
+              <a:gd name="adj" fmla="val 4048"/>
+            </a:avLst>
+          </a:prstGeom>
+          <a:solidFill>
+            <a:schemeClr val="bg1"/>
+          </a:solidFill>
+          <a:ln>
+            <a:noFill/>
+          </a:ln>
+        </p:spPr>
+        <p:style>
+          <a:lnRef idx="2">
+            <a:schemeClr val="accent1">
+              <a:shade val="15000"/>
+            </a:schemeClr>
+          </a:lnRef>
+          <a:fillRef idx="1">
+            <a:schemeClr val="accent1"/>
+          </a:fillRef>
+          <a:effectRef idx="0">
+            <a:schemeClr val="accent1"/>
+          </a:effectRef>
+          <a:fontRef idx="minor">
+            <a:schemeClr val="lt1"/>
+          </a:fontRef>
+        </p:style>
+        <p:txBody>
+          <a:bodyPr rtlCol="0" anchor="ctr"/>
+          <a:lstStyle/>
+          <a:p>
+            <a:pPr algn="ctr"/>
+            <a:endParaRPr lang="en-GB"/>
+          </a:p>
+        </p:txBody>
+      </p:sp>
+      <p:sp>
+        <p:nvSpPr>
+          <p:cNvPr id="9" name="Rectangle: Rounded Corners 8">
+            <a:extLst>
+              <a:ext uri="{FF2B5EF4-FFF2-40B4-BE49-F238E27FC236}">
+                <a16:creationId xmlns:a16="http://schemas.microsoft.com/office/drawing/2014/main" id="{7540F57C-B207-8355-3B1B-5A7AF6E186E7}"/>
+              </a:ext>
+            </a:extLst>
+          </p:cNvPr>
+          <p:cNvSpPr/>
+          <p:nvPr/>
+        </p:nvSpPr>
+        <p:spPr>
+          <a:xfrm>
+            <a:off x="1040576" y="3907688"/>
+            <a:ext cx="4176405" cy="3157419"/>
+          </a:xfrm>
+          <a:prstGeom prst="roundRect">
+            <a:avLst>
+              <a:gd name="adj" fmla="val 4048"/>
+            </a:avLst>
+          </a:prstGeom>
+          <a:solidFill>
+            <a:schemeClr val="bg1"/>
+          </a:solidFill>
+          <a:ln>
+            <a:noFill/>
+          </a:ln>
+        </p:spPr>
+        <p:style>
+          <a:lnRef idx="2">
+            <a:schemeClr val="accent1">
+              <a:shade val="15000"/>
+            </a:schemeClr>
+          </a:lnRef>
+          <a:fillRef idx="1">
+            <a:schemeClr val="accent1"/>
+          </a:fillRef>
+          <a:effectRef idx="0">
+            <a:schemeClr val="accent1"/>
+          </a:effectRef>
+          <a:fontRef idx="minor">
+            <a:schemeClr val="lt1"/>
+          </a:fontRef>
+        </p:style>
+        <p:txBody>
+          <a:bodyPr rtlCol="0" anchor="ctr"/>
+          <a:lstStyle/>
+          <a:p>
+            <a:pPr algn="ctr"/>
+            <a:endParaRPr lang="en-GB"/>
+          </a:p>
+        </p:txBody>
+      </p:sp>
+      <p:sp>
+        <p:nvSpPr>
+          <p:cNvPr id="10" name="Rectangle: Rounded Corners 9">
+            <a:extLst>
+              <a:ext uri="{FF2B5EF4-FFF2-40B4-BE49-F238E27FC236}">
+                <a16:creationId xmlns:a16="http://schemas.microsoft.com/office/drawing/2014/main" id="{7D01CB58-28A4-85AC-774E-9BDF32DD0DF0}"/>
+              </a:ext>
+            </a:extLst>
+          </p:cNvPr>
+          <p:cNvSpPr/>
+          <p:nvPr/>
+        </p:nvSpPr>
+        <p:spPr>
+          <a:xfrm>
+            <a:off x="5644036" y="3907687"/>
+            <a:ext cx="4095262" cy="3157419"/>
+          </a:xfrm>
+          <a:prstGeom prst="roundRect">
+            <a:avLst>
+              <a:gd name="adj" fmla="val 4048"/>
+            </a:avLst>
+          </a:prstGeom>
+          <a:solidFill>
+            <a:schemeClr val="bg1"/>
+          </a:solidFill>
+          <a:ln>
+            <a:noFill/>
+          </a:ln>
+        </p:spPr>
+        <p:style>
+          <a:lnRef idx="2">
+            <a:schemeClr val="accent1">
+              <a:shade val="15000"/>
+            </a:schemeClr>
+          </a:lnRef>
+          <a:fillRef idx="1">
+            <a:schemeClr val="accent1"/>
+          </a:fillRef>
+          <a:effectRef idx="0">
+            <a:schemeClr val="accent1"/>
+          </a:effectRef>
+          <a:fontRef idx="minor">
+            <a:schemeClr val="lt1"/>
+          </a:fontRef>
+        </p:style>
+        <p:txBody>
+          <a:bodyPr rtlCol="0" anchor="ctr"/>
+          <a:lstStyle/>
+          <a:p>
+            <a:pPr algn="ctr"/>
+            <a:endParaRPr lang="en-GB"/>
+          </a:p>
+        </p:txBody>
+      </p:sp>
+      <p:sp>
+        <p:nvSpPr>
+          <p:cNvPr id="11" name="Rectangle: Rounded Corners 10">
+            <a:extLst>
+              <a:ext uri="{FF2B5EF4-FFF2-40B4-BE49-F238E27FC236}">
+                <a16:creationId xmlns:a16="http://schemas.microsoft.com/office/drawing/2014/main" id="{E3187489-A794-EB9F-3C90-AF595DC2571D}"/>
+              </a:ext>
+            </a:extLst>
+          </p:cNvPr>
+          <p:cNvSpPr/>
+          <p:nvPr/>
+        </p:nvSpPr>
+        <p:spPr>
+          <a:xfrm>
+            <a:off x="10166353" y="3907686"/>
+            <a:ext cx="4269704" cy="3157419"/>
+          </a:xfrm>
+          <a:prstGeom prst="roundRect">
+            <a:avLst>
+              <a:gd name="adj" fmla="val 4048"/>
+            </a:avLst>
+          </a:prstGeom>
+          <a:solidFill>
+            <a:schemeClr val="bg1"/>
+          </a:solidFill>
+          <a:ln>
+            <a:noFill/>
+          </a:ln>
+        </p:spPr>
+        <p:style>
+          <a:lnRef idx="2">
+            <a:schemeClr val="accent1">
+              <a:shade val="15000"/>
+            </a:schemeClr>
+          </a:lnRef>
+          <a:fillRef idx="1">
+            <a:schemeClr val="accent1"/>
+          </a:fillRef>
+          <a:effectRef idx="0">
+            <a:schemeClr val="accent1"/>
+          </a:effectRef>
+          <a:fontRef idx="minor">
+            <a:schemeClr val="lt1"/>
+          </a:fontRef>
+        </p:style>
+        <p:txBody>
+          <a:bodyPr rtlCol="0" anchor="ctr"/>
+          <a:lstStyle/>
+          <a:p>
+            <a:pPr algn="ctr"/>
+            <a:endParaRPr lang="en-GB"/>
+          </a:p>
+        </p:txBody>
+      </p:sp>
+      <p:sp>
+        <p:nvSpPr>
+          <p:cNvPr id="20" name="Rectangle: Rounded Corners 19">
+            <a:extLst>
+              <a:ext uri="{FF2B5EF4-FFF2-40B4-BE49-F238E27FC236}">
+                <a16:creationId xmlns:a16="http://schemas.microsoft.com/office/drawing/2014/main" id="{DE1CE4F0-9ACF-C0A2-2F1D-473D3FCBD535}"/>
+              </a:ext>
+            </a:extLst>
+          </p:cNvPr>
+          <p:cNvSpPr/>
+          <p:nvPr/>
+        </p:nvSpPr>
+        <p:spPr>
+          <a:xfrm>
+            <a:off x="1037464" y="7127541"/>
+            <a:ext cx="13398593" cy="570613"/>
+          </a:xfrm>
+          <a:prstGeom prst="roundRect">
+            <a:avLst>
+              <a:gd name="adj" fmla="val 19114"/>
+            </a:avLst>
+          </a:prstGeom>
+          <a:solidFill>
+            <a:schemeClr val="bg1"/>
+          </a:solidFill>
+          <a:ln>
+            <a:noFill/>
+          </a:ln>
+        </p:spPr>
+        <p:style>
+          <a:lnRef idx="2">
+            <a:schemeClr val="accent1">
+              <a:shade val="15000"/>
+            </a:schemeClr>
+          </a:lnRef>
+          <a:fillRef idx="1">
+            <a:schemeClr val="accent1"/>
+          </a:fillRef>
+          <a:effectRef idx="0">
+            <a:schemeClr val="accent1"/>
+          </a:effectRef>
+          <a:fontRef idx="minor">
+            <a:schemeClr val="lt1"/>
+          </a:fontRef>
+        </p:style>
+        <p:txBody>
+          <a:bodyPr rtlCol="0" anchor="ctr"/>
+          <a:lstStyle/>
+          <a:p>
+            <a:pPr algn="ctr"/>
+            <a:endParaRPr lang="en-GB"/>
+          </a:p>
+        </p:txBody>
+      </p:sp>
     </p:spTree>
     <p:extLst>
       <p:ext uri="{BB962C8B-B14F-4D97-AF65-F5344CB8AC3E}">
@@ -5595,6 +6087,807 @@
 </file>
 
 <file path=ppt/slides/slide3.xml><?xml version="1.0" encoding="utf-8"?>
+<p:sld xmlns:a="http://schemas.openxmlformats.org/drawingml/2006/main" xmlns:r="http://schemas.openxmlformats.org/officeDocument/2006/relationships" xmlns:p="http://schemas.openxmlformats.org/presentationml/2006/main">
+  <p:cSld>
+    <p:bg>
+      <p:bgPr>
+        <a:solidFill>
+          <a:srgbClr val="BEC5CC">
+            <a:alpha val="49804"/>
+          </a:srgbClr>
+        </a:solidFill>
+        <a:effectLst/>
+      </p:bgPr>
+    </p:bg>
+    <p:spTree>
+      <p:nvGrpSpPr>
+        <p:cNvPr id="1" name="">
+          <a:extLst>
+            <a:ext uri="{FF2B5EF4-FFF2-40B4-BE49-F238E27FC236}">
+              <a16:creationId xmlns:a16="http://schemas.microsoft.com/office/drawing/2014/main" id="{A56EECA9-2A80-0337-C17E-692ECC6C3F86}"/>
+            </a:ext>
+          </a:extLst>
+        </p:cNvPr>
+        <p:cNvGrpSpPr/>
+        <p:nvPr/>
+      </p:nvGrpSpPr>
+      <p:grpSpPr>
+        <a:xfrm>
+          <a:off x="0" y="0"/>
+          <a:ext cx="0" cy="0"/>
+          <a:chOff x="0" y="0"/>
+          <a:chExt cx="0" cy="0"/>
+        </a:xfrm>
+      </p:grpSpPr>
+      <p:pic>
+        <p:nvPicPr>
+          <p:cNvPr id="5" name="Picture 4" descr="A screenshot of a computer" hidden="1">
+            <a:extLst>
+              <a:ext uri="{FF2B5EF4-FFF2-40B4-BE49-F238E27FC236}">
+                <a16:creationId xmlns:a16="http://schemas.microsoft.com/office/drawing/2014/main" id="{5496BE8B-E6EF-D767-0475-0C553F939E01}"/>
+              </a:ext>
+            </a:extLst>
+          </p:cNvPr>
+          <p:cNvPicPr>
+            <a:picLocks noChangeAspect="1"/>
+          </p:cNvPicPr>
+          <p:nvPr/>
+        </p:nvPicPr>
+        <p:blipFill>
+          <a:blip r:embed="rId2">
+            <a:extLst>
+              <a:ext uri="{28A0092B-C50C-407E-A947-70E740481C1C}">
+                <a14:useLocalDpi xmlns:a14="http://schemas.microsoft.com/office/drawing/2010/main" val="0"/>
+              </a:ext>
+            </a:extLst>
+          </a:blip>
+          <a:stretch>
+            <a:fillRect/>
+          </a:stretch>
+        </p:blipFill>
+        <p:spPr>
+          <a:xfrm>
+            <a:off x="0" y="15317"/>
+            <a:ext cx="14630400" cy="8198966"/>
+          </a:xfrm>
+          <a:prstGeom prst="rect">
+            <a:avLst/>
+          </a:prstGeom>
+        </p:spPr>
+      </p:pic>
+      <p:grpSp>
+        <p:nvGrpSpPr>
+          <p:cNvPr id="12" name="Group 11">
+            <a:extLst>
+              <a:ext uri="{FF2B5EF4-FFF2-40B4-BE49-F238E27FC236}">
+                <a16:creationId xmlns:a16="http://schemas.microsoft.com/office/drawing/2014/main" id="{1A2A38F3-5988-4D86-A6E3-EC8512D9FD60}"/>
+              </a:ext>
+            </a:extLst>
+          </p:cNvPr>
+          <p:cNvGrpSpPr/>
+          <p:nvPr/>
+        </p:nvGrpSpPr>
+        <p:grpSpPr>
+          <a:xfrm>
+            <a:off x="-60564" y="7776309"/>
+            <a:ext cx="14816010" cy="609756"/>
+            <a:chOff x="-56171" y="7768341"/>
+            <a:chExt cx="14742739" cy="469097"/>
+          </a:xfrm>
+          <a:solidFill>
+            <a:schemeClr val="bg1">
+              <a:lumMod val="95000"/>
+            </a:schemeClr>
+          </a:solidFill>
+        </p:grpSpPr>
+        <p:sp>
+          <p:nvSpPr>
+            <p:cNvPr id="13" name="Rectangle 12">
+              <a:extLst>
+                <a:ext uri="{FF2B5EF4-FFF2-40B4-BE49-F238E27FC236}">
+                  <a16:creationId xmlns:a16="http://schemas.microsoft.com/office/drawing/2014/main" id="{6B193121-FB33-FFED-EFC3-49836DCCD4A7}"/>
+                </a:ext>
+              </a:extLst>
+            </p:cNvPr>
+            <p:cNvSpPr/>
+            <p:nvPr/>
+          </p:nvSpPr>
+          <p:spPr>
+            <a:xfrm rot="10800000">
+              <a:off x="-56171" y="7768341"/>
+              <a:ext cx="14742739" cy="469097"/>
+            </a:xfrm>
+            <a:prstGeom prst="rect">
+              <a:avLst/>
+            </a:prstGeom>
+            <a:grpFill/>
+            <a:ln w="41275">
+              <a:gradFill flip="none" rotWithShape="1">
+                <a:gsLst>
+                  <a:gs pos="0">
+                    <a:schemeClr val="bg1">
+                      <a:lumMod val="65000"/>
+                    </a:schemeClr>
+                  </a:gs>
+                  <a:gs pos="74000">
+                    <a:schemeClr val="tx1">
+                      <a:lumMod val="50000"/>
+                      <a:lumOff val="50000"/>
+                    </a:schemeClr>
+                  </a:gs>
+                  <a:gs pos="83000">
+                    <a:schemeClr val="tx1">
+                      <a:lumMod val="65000"/>
+                      <a:lumOff val="35000"/>
+                    </a:schemeClr>
+                  </a:gs>
+                  <a:gs pos="100000">
+                    <a:schemeClr val="tx1">
+                      <a:lumMod val="85000"/>
+                      <a:lumOff val="15000"/>
+                    </a:schemeClr>
+                  </a:gs>
+                </a:gsLst>
+                <a:lin ang="10800000" scaled="1"/>
+                <a:tileRect/>
+              </a:gradFill>
+            </a:ln>
+          </p:spPr>
+          <p:style>
+            <a:lnRef idx="2">
+              <a:schemeClr val="accent1">
+                <a:shade val="15000"/>
+              </a:schemeClr>
+            </a:lnRef>
+            <a:fillRef idx="1">
+              <a:schemeClr val="accent1"/>
+            </a:fillRef>
+            <a:effectRef idx="0">
+              <a:schemeClr val="accent1"/>
+            </a:effectRef>
+            <a:fontRef idx="minor">
+              <a:schemeClr val="lt1"/>
+            </a:fontRef>
+          </p:style>
+          <p:txBody>
+            <a:bodyPr rtlCol="0" anchor="ctr"/>
+            <a:lstStyle/>
+            <a:p>
+              <a:pPr algn="ctr"/>
+              <a:endParaRPr lang="en-GB"/>
+            </a:p>
+          </p:txBody>
+        </p:sp>
+        <p:sp>
+          <p:nvSpPr>
+            <p:cNvPr id="14" name="TextBox 13">
+              <a:extLst>
+                <a:ext uri="{FF2B5EF4-FFF2-40B4-BE49-F238E27FC236}">
+                  <a16:creationId xmlns:a16="http://schemas.microsoft.com/office/drawing/2014/main" id="{D5DD3F4E-1772-4AD4-D9DD-BCCD513966A0}"/>
+                </a:ext>
+              </a:extLst>
+            </p:cNvPr>
+            <p:cNvSpPr txBox="1"/>
+            <p:nvPr/>
+          </p:nvSpPr>
+          <p:spPr>
+            <a:xfrm>
+              <a:off x="0" y="7804414"/>
+              <a:ext cx="3972562" cy="387798"/>
+            </a:xfrm>
+            <a:prstGeom prst="rect">
+              <a:avLst/>
+            </a:prstGeom>
+            <a:grpFill/>
+            <a:ln w="41275">
+              <a:noFill/>
+            </a:ln>
+          </p:spPr>
+          <p:style>
+            <a:lnRef idx="2">
+              <a:schemeClr val="accent1">
+                <a:shade val="15000"/>
+              </a:schemeClr>
+            </a:lnRef>
+            <a:fillRef idx="1">
+              <a:schemeClr val="accent1"/>
+            </a:fillRef>
+            <a:effectRef idx="0">
+              <a:schemeClr val="accent1"/>
+            </a:effectRef>
+            <a:fontRef idx="minor">
+              <a:schemeClr val="lt1"/>
+            </a:fontRef>
+          </p:style>
+          <p:txBody>
+            <a:bodyPr rtlCol="0" anchor="ctr"/>
+            <a:lstStyle>
+              <a:defPPr>
+                <a:defRPr lang="en-US"/>
+              </a:defPPr>
+              <a:lvl1pPr algn="ctr">
+                <a:defRPr>
+                  <a:solidFill>
+                    <a:schemeClr val="lt1"/>
+                  </a:solidFill>
+                </a:defRPr>
+              </a:lvl1pPr>
+              <a:lvl2pPr>
+                <a:defRPr>
+                  <a:solidFill>
+                    <a:schemeClr val="lt1"/>
+                  </a:solidFill>
+                </a:defRPr>
+              </a:lvl2pPr>
+              <a:lvl3pPr>
+                <a:defRPr>
+                  <a:solidFill>
+                    <a:schemeClr val="lt1"/>
+                  </a:solidFill>
+                </a:defRPr>
+              </a:lvl3pPr>
+              <a:lvl4pPr>
+                <a:defRPr>
+                  <a:solidFill>
+                    <a:schemeClr val="lt1"/>
+                  </a:solidFill>
+                </a:defRPr>
+              </a:lvl4pPr>
+              <a:lvl5pPr>
+                <a:defRPr>
+                  <a:solidFill>
+                    <a:schemeClr val="lt1"/>
+                  </a:solidFill>
+                </a:defRPr>
+              </a:lvl5pPr>
+              <a:lvl6pPr>
+                <a:defRPr>
+                  <a:solidFill>
+                    <a:schemeClr val="lt1"/>
+                  </a:solidFill>
+                </a:defRPr>
+              </a:lvl6pPr>
+              <a:lvl7pPr>
+                <a:defRPr>
+                  <a:solidFill>
+                    <a:schemeClr val="lt1"/>
+                  </a:solidFill>
+                </a:defRPr>
+              </a:lvl7pPr>
+              <a:lvl8pPr>
+                <a:defRPr>
+                  <a:solidFill>
+                    <a:schemeClr val="lt1"/>
+                  </a:solidFill>
+                </a:defRPr>
+              </a:lvl8pPr>
+              <a:lvl9pPr>
+                <a:defRPr>
+                  <a:solidFill>
+                    <a:schemeClr val="lt1"/>
+                  </a:solidFill>
+                </a:defRPr>
+              </a:lvl9pPr>
+            </a:lstStyle>
+            <a:p>
+              <a:r>
+                <a:rPr lang="en-GB" dirty="0">
+                  <a:gradFill flip="none" rotWithShape="1">
+                    <a:gsLst>
+                      <a:gs pos="0">
+                        <a:schemeClr val="tx1">
+                          <a:lumMod val="50000"/>
+                          <a:lumOff val="50000"/>
+                        </a:schemeClr>
+                      </a:gs>
+                      <a:gs pos="74000">
+                        <a:schemeClr val="tx1">
+                          <a:lumMod val="50000"/>
+                          <a:lumOff val="50000"/>
+                        </a:schemeClr>
+                      </a:gs>
+                      <a:gs pos="83000">
+                        <a:schemeClr val="tx1">
+                          <a:lumMod val="65000"/>
+                          <a:lumOff val="35000"/>
+                        </a:schemeClr>
+                      </a:gs>
+                      <a:gs pos="100000">
+                        <a:schemeClr val="tx1">
+                          <a:lumMod val="75000"/>
+                          <a:lumOff val="25000"/>
+                        </a:schemeClr>
+                      </a:gs>
+                    </a:gsLst>
+                    <a:lin ang="0" scaled="1"/>
+                    <a:tileRect/>
+                  </a:gradFill>
+                </a:rPr>
+                <a:t>Tool Designed by Andrew Hubbard</a:t>
+              </a:r>
+            </a:p>
+          </p:txBody>
+        </p:sp>
+      </p:grpSp>
+      <p:sp>
+        <p:nvSpPr>
+          <p:cNvPr id="16" name="Rectangle 15">
+            <a:extLst>
+              <a:ext uri="{FF2B5EF4-FFF2-40B4-BE49-F238E27FC236}">
+                <a16:creationId xmlns:a16="http://schemas.microsoft.com/office/drawing/2014/main" id="{E59D437E-7211-4011-E839-86324B767B89}"/>
+              </a:ext>
+            </a:extLst>
+          </p:cNvPr>
+          <p:cNvSpPr/>
+          <p:nvPr/>
+        </p:nvSpPr>
+        <p:spPr>
+          <a:xfrm rot="10800000">
+            <a:off x="-117232" y="-54863"/>
+            <a:ext cx="14816011" cy="609756"/>
+          </a:xfrm>
+          <a:prstGeom prst="rect">
+            <a:avLst/>
+          </a:prstGeom>
+          <a:solidFill>
+            <a:schemeClr val="bg1">
+              <a:lumMod val="95000"/>
+            </a:schemeClr>
+          </a:solidFill>
+          <a:ln w="41275">
+            <a:gradFill flip="none" rotWithShape="1">
+              <a:gsLst>
+                <a:gs pos="0">
+                  <a:schemeClr val="bg1">
+                    <a:lumMod val="65000"/>
+                  </a:schemeClr>
+                </a:gs>
+                <a:gs pos="74000">
+                  <a:schemeClr val="tx1">
+                    <a:lumMod val="50000"/>
+                    <a:lumOff val="50000"/>
+                  </a:schemeClr>
+                </a:gs>
+                <a:gs pos="83000">
+                  <a:schemeClr val="tx1">
+                    <a:lumMod val="65000"/>
+                    <a:lumOff val="35000"/>
+                  </a:schemeClr>
+                </a:gs>
+                <a:gs pos="100000">
+                  <a:schemeClr val="tx1">
+                    <a:lumMod val="85000"/>
+                    <a:lumOff val="15000"/>
+                  </a:schemeClr>
+                </a:gs>
+              </a:gsLst>
+              <a:lin ang="0" scaled="1"/>
+              <a:tileRect/>
+            </a:gradFill>
+          </a:ln>
+        </p:spPr>
+        <p:style>
+          <a:lnRef idx="2">
+            <a:schemeClr val="accent1">
+              <a:shade val="15000"/>
+            </a:schemeClr>
+          </a:lnRef>
+          <a:fillRef idx="1">
+            <a:schemeClr val="accent1"/>
+          </a:fillRef>
+          <a:effectRef idx="0">
+            <a:schemeClr val="accent1"/>
+          </a:effectRef>
+          <a:fontRef idx="minor">
+            <a:schemeClr val="lt1"/>
+          </a:fontRef>
+        </p:style>
+        <p:txBody>
+          <a:bodyPr rtlCol="0" anchor="ctr"/>
+          <a:lstStyle/>
+          <a:p>
+            <a:pPr algn="ctr"/>
+            <a:endParaRPr lang="en-GB"/>
+          </a:p>
+        </p:txBody>
+      </p:sp>
+      <p:sp>
+        <p:nvSpPr>
+          <p:cNvPr id="19" name="TextBox 18">
+            <a:extLst>
+              <a:ext uri="{FF2B5EF4-FFF2-40B4-BE49-F238E27FC236}">
+                <a16:creationId xmlns:a16="http://schemas.microsoft.com/office/drawing/2014/main" id="{835B37D9-CC5D-54EC-1217-809B5DCD0483}"/>
+              </a:ext>
+            </a:extLst>
+          </p:cNvPr>
+          <p:cNvSpPr txBox="1"/>
+          <p:nvPr/>
+        </p:nvSpPr>
+        <p:spPr>
+          <a:xfrm>
+            <a:off x="-60566" y="-27340"/>
+            <a:ext cx="14690965" cy="504079"/>
+          </a:xfrm>
+          <a:prstGeom prst="rect">
+            <a:avLst/>
+          </a:prstGeom>
+          <a:solidFill>
+            <a:schemeClr val="bg1">
+              <a:lumMod val="95000"/>
+            </a:schemeClr>
+          </a:solidFill>
+          <a:ln w="41275">
+            <a:noFill/>
+          </a:ln>
+        </p:spPr>
+        <p:style>
+          <a:lnRef idx="2">
+            <a:schemeClr val="accent1">
+              <a:shade val="15000"/>
+            </a:schemeClr>
+          </a:lnRef>
+          <a:fillRef idx="1">
+            <a:schemeClr val="accent1"/>
+          </a:fillRef>
+          <a:effectRef idx="0">
+            <a:schemeClr val="accent1"/>
+          </a:effectRef>
+          <a:fontRef idx="minor">
+            <a:schemeClr val="lt1"/>
+          </a:fontRef>
+        </p:style>
+        <p:txBody>
+          <a:bodyPr rtlCol="0" anchor="ctr"/>
+          <a:lstStyle>
+            <a:defPPr>
+              <a:defRPr lang="en-US"/>
+            </a:defPPr>
+            <a:lvl1pPr algn="ctr">
+              <a:defRPr>
+                <a:solidFill>
+                  <a:schemeClr val="lt1"/>
+                </a:solidFill>
+              </a:defRPr>
+            </a:lvl1pPr>
+            <a:lvl2pPr>
+              <a:defRPr>
+                <a:solidFill>
+                  <a:schemeClr val="lt1"/>
+                </a:solidFill>
+              </a:defRPr>
+            </a:lvl2pPr>
+            <a:lvl3pPr>
+              <a:defRPr>
+                <a:solidFill>
+                  <a:schemeClr val="lt1"/>
+                </a:solidFill>
+              </a:defRPr>
+            </a:lvl3pPr>
+            <a:lvl4pPr>
+              <a:defRPr>
+                <a:solidFill>
+                  <a:schemeClr val="lt1"/>
+                </a:solidFill>
+              </a:defRPr>
+            </a:lvl4pPr>
+            <a:lvl5pPr>
+              <a:defRPr>
+                <a:solidFill>
+                  <a:schemeClr val="lt1"/>
+                </a:solidFill>
+              </a:defRPr>
+            </a:lvl5pPr>
+            <a:lvl6pPr>
+              <a:defRPr>
+                <a:solidFill>
+                  <a:schemeClr val="lt1"/>
+                </a:solidFill>
+              </a:defRPr>
+            </a:lvl6pPr>
+            <a:lvl7pPr>
+              <a:defRPr>
+                <a:solidFill>
+                  <a:schemeClr val="lt1"/>
+                </a:solidFill>
+              </a:defRPr>
+            </a:lvl7pPr>
+            <a:lvl8pPr>
+              <a:defRPr>
+                <a:solidFill>
+                  <a:schemeClr val="lt1"/>
+                </a:solidFill>
+              </a:defRPr>
+            </a:lvl8pPr>
+            <a:lvl9pPr>
+              <a:defRPr>
+                <a:solidFill>
+                  <a:schemeClr val="lt1"/>
+                </a:solidFill>
+              </a:defRPr>
+            </a:lvl9pPr>
+          </a:lstStyle>
+          <a:p>
+            <a:r>
+              <a:rPr lang="en-GB" dirty="0">
+                <a:gradFill flip="none" rotWithShape="1">
+                  <a:gsLst>
+                    <a:gs pos="0">
+                      <a:schemeClr val="tx1">
+                        <a:lumMod val="50000"/>
+                        <a:lumOff val="50000"/>
+                      </a:schemeClr>
+                    </a:gs>
+                    <a:gs pos="74000">
+                      <a:schemeClr val="tx1">
+                        <a:lumMod val="50000"/>
+                        <a:lumOff val="50000"/>
+                      </a:schemeClr>
+                    </a:gs>
+                    <a:gs pos="83000">
+                      <a:schemeClr val="tx1">
+                        <a:lumMod val="65000"/>
+                        <a:lumOff val="35000"/>
+                      </a:schemeClr>
+                    </a:gs>
+                    <a:gs pos="100000">
+                      <a:schemeClr val="tx1">
+                        <a:lumMod val="75000"/>
+                        <a:lumOff val="25000"/>
+                      </a:schemeClr>
+                    </a:gs>
+                  </a:gsLst>
+                  <a:lin ang="0" scaled="1"/>
+                  <a:tileRect/>
+                </a:gradFill>
+              </a:rPr>
+              <a:t>Mainstreet Mercantile - Sales Analysis - 2024</a:t>
+            </a:r>
+          </a:p>
+        </p:txBody>
+      </p:sp>
+      <p:pic>
+        <p:nvPicPr>
+          <p:cNvPr id="27" name="Picture 26" descr="A circular picture of a building&#10;&#10;AI-generated content may be incorrect.">
+            <a:extLst>
+              <a:ext uri="{FF2B5EF4-FFF2-40B4-BE49-F238E27FC236}">
+                <a16:creationId xmlns:a16="http://schemas.microsoft.com/office/drawing/2014/main" id="{3591EA3F-F31B-B7C3-4155-6CA3BCEBE7B1}"/>
+              </a:ext>
+            </a:extLst>
+          </p:cNvPr>
+          <p:cNvPicPr>
+            <a:picLocks noChangeAspect="1"/>
+          </p:cNvPicPr>
+          <p:nvPr/>
+        </p:nvPicPr>
+        <p:blipFill>
+          <a:blip r:embed="rId3">
+            <a:extLst>
+              <a:ext uri="{28A0092B-C50C-407E-A947-70E740481C1C}">
+                <a14:useLocalDpi xmlns:a14="http://schemas.microsoft.com/office/drawing/2010/main" val="0"/>
+              </a:ext>
+            </a:extLst>
+          </a:blip>
+          <a:stretch>
+            <a:fillRect/>
+          </a:stretch>
+        </p:blipFill>
+        <p:spPr>
+          <a:xfrm>
+            <a:off x="14067693" y="-13716"/>
+            <a:ext cx="518743" cy="518743"/>
+          </a:xfrm>
+          <a:prstGeom prst="rect">
+            <a:avLst/>
+          </a:prstGeom>
+        </p:spPr>
+      </p:pic>
+      <p:grpSp>
+        <p:nvGrpSpPr>
+          <p:cNvPr id="28" name="Group 27">
+            <a:extLst>
+              <a:ext uri="{FF2B5EF4-FFF2-40B4-BE49-F238E27FC236}">
+                <a16:creationId xmlns:a16="http://schemas.microsoft.com/office/drawing/2014/main" id="{C306E60F-9B59-E20A-5D2A-DE6665E9ED12}"/>
+              </a:ext>
+            </a:extLst>
+          </p:cNvPr>
+          <p:cNvGrpSpPr/>
+          <p:nvPr/>
+        </p:nvGrpSpPr>
+        <p:grpSpPr>
+          <a:xfrm>
+            <a:off x="-4114" y="633046"/>
+            <a:ext cx="823072" cy="6986956"/>
+            <a:chOff x="-349" y="1094155"/>
+            <a:chExt cx="764946" cy="6520147"/>
+          </a:xfrm>
+        </p:grpSpPr>
+        <p:sp>
+          <p:nvSpPr>
+            <p:cNvPr id="29" name="Rectangle: Rounded Corners 28">
+              <a:extLst>
+                <a:ext uri="{FF2B5EF4-FFF2-40B4-BE49-F238E27FC236}">
+                  <a16:creationId xmlns:a16="http://schemas.microsoft.com/office/drawing/2014/main" id="{D1B4F12D-3E6A-9BBA-0C83-FE62505C70A5}"/>
+                </a:ext>
+              </a:extLst>
+            </p:cNvPr>
+            <p:cNvSpPr/>
+            <p:nvPr/>
+          </p:nvSpPr>
+          <p:spPr>
+            <a:xfrm>
+              <a:off x="-349" y="1094155"/>
+              <a:ext cx="764946" cy="6519828"/>
+            </a:xfrm>
+            <a:prstGeom prst="roundRect">
+              <a:avLst>
+                <a:gd name="adj" fmla="val 11559"/>
+              </a:avLst>
+            </a:prstGeom>
+            <a:solidFill>
+              <a:schemeClr val="bg1">
+                <a:lumMod val="95000"/>
+              </a:schemeClr>
+            </a:solidFill>
+            <a:ln w="41275">
+              <a:noFill/>
+            </a:ln>
+          </p:spPr>
+          <p:style>
+            <a:lnRef idx="2">
+              <a:schemeClr val="accent1">
+                <a:shade val="15000"/>
+              </a:schemeClr>
+            </a:lnRef>
+            <a:fillRef idx="1">
+              <a:schemeClr val="accent1"/>
+            </a:fillRef>
+            <a:effectRef idx="0">
+              <a:schemeClr val="accent1"/>
+            </a:effectRef>
+            <a:fontRef idx="minor">
+              <a:schemeClr val="lt1"/>
+            </a:fontRef>
+          </p:style>
+          <p:txBody>
+            <a:bodyPr rtlCol="0" anchor="ctr"/>
+            <a:lstStyle/>
+            <a:p>
+              <a:pPr algn="ctr"/>
+              <a:endParaRPr lang="en-GB" dirty="0">
+                <a:gradFill flip="none" rotWithShape="1">
+                  <a:gsLst>
+                    <a:gs pos="0">
+                      <a:schemeClr val="tx1">
+                        <a:lumMod val="50000"/>
+                        <a:lumOff val="50000"/>
+                      </a:schemeClr>
+                    </a:gs>
+                    <a:gs pos="74000">
+                      <a:schemeClr val="tx1">
+                        <a:lumMod val="50000"/>
+                        <a:lumOff val="50000"/>
+                      </a:schemeClr>
+                    </a:gs>
+                    <a:gs pos="83000">
+                      <a:schemeClr val="tx1">
+                        <a:lumMod val="65000"/>
+                        <a:lumOff val="35000"/>
+                      </a:schemeClr>
+                    </a:gs>
+                    <a:gs pos="100000">
+                      <a:schemeClr val="tx1">
+                        <a:lumMod val="75000"/>
+                        <a:lumOff val="25000"/>
+                      </a:schemeClr>
+                    </a:gs>
+                  </a:gsLst>
+                  <a:lin ang="0" scaled="1"/>
+                  <a:tileRect/>
+                </a:gradFill>
+              </a:endParaRPr>
+            </a:p>
+          </p:txBody>
+        </p:sp>
+        <p:sp>
+          <p:nvSpPr>
+            <p:cNvPr id="30" name="Rectangle 29">
+              <a:extLst>
+                <a:ext uri="{FF2B5EF4-FFF2-40B4-BE49-F238E27FC236}">
+                  <a16:creationId xmlns:a16="http://schemas.microsoft.com/office/drawing/2014/main" id="{AB1977F4-FFE3-3ABF-3E50-ED0E897399D8}"/>
+                </a:ext>
+              </a:extLst>
+            </p:cNvPr>
+            <p:cNvSpPr/>
+            <p:nvPr/>
+          </p:nvSpPr>
+          <p:spPr>
+            <a:xfrm>
+              <a:off x="-349" y="1094474"/>
+              <a:ext cx="492718" cy="6519828"/>
+            </a:xfrm>
+            <a:prstGeom prst="rect">
+              <a:avLst/>
+            </a:prstGeom>
+            <a:solidFill>
+              <a:schemeClr val="bg1">
+                <a:lumMod val="95000"/>
+              </a:schemeClr>
+            </a:solidFill>
+            <a:ln w="41275">
+              <a:noFill/>
+            </a:ln>
+          </p:spPr>
+          <p:style>
+            <a:lnRef idx="2">
+              <a:schemeClr val="accent1">
+                <a:shade val="15000"/>
+              </a:schemeClr>
+            </a:lnRef>
+            <a:fillRef idx="1">
+              <a:schemeClr val="accent1"/>
+            </a:fillRef>
+            <a:effectRef idx="0">
+              <a:schemeClr val="accent1"/>
+            </a:effectRef>
+            <a:fontRef idx="minor">
+              <a:schemeClr val="lt1"/>
+            </a:fontRef>
+          </p:style>
+          <p:txBody>
+            <a:bodyPr rtlCol="0" anchor="ctr"/>
+            <a:lstStyle/>
+            <a:p>
+              <a:pPr algn="ctr"/>
+              <a:endParaRPr lang="en-GB">
+                <a:gradFill flip="none" rotWithShape="1">
+                  <a:gsLst>
+                    <a:gs pos="0">
+                      <a:schemeClr val="tx1">
+                        <a:lumMod val="50000"/>
+                        <a:lumOff val="50000"/>
+                      </a:schemeClr>
+                    </a:gs>
+                    <a:gs pos="74000">
+                      <a:schemeClr val="tx1">
+                        <a:lumMod val="50000"/>
+                        <a:lumOff val="50000"/>
+                      </a:schemeClr>
+                    </a:gs>
+                    <a:gs pos="83000">
+                      <a:schemeClr val="tx1">
+                        <a:lumMod val="65000"/>
+                        <a:lumOff val="35000"/>
+                      </a:schemeClr>
+                    </a:gs>
+                    <a:gs pos="100000">
+                      <a:schemeClr val="tx1">
+                        <a:lumMod val="75000"/>
+                        <a:lumOff val="25000"/>
+                      </a:schemeClr>
+                    </a:gs>
+                  </a:gsLst>
+                  <a:lin ang="0" scaled="1"/>
+                  <a:tileRect/>
+                </a:gradFill>
+              </a:endParaRPr>
+            </a:p>
+          </p:txBody>
+        </p:sp>
+      </p:grpSp>
+    </p:spTree>
+    <p:extLst>
+      <p:ext uri="{BB962C8B-B14F-4D97-AF65-F5344CB8AC3E}">
+        <p14:creationId xmlns:p14="http://schemas.microsoft.com/office/powerpoint/2010/main" val="2069518278"/>
+      </p:ext>
+    </p:extLst>
+  </p:cSld>
+  <p:clrMapOvr>
+    <a:masterClrMapping/>
+  </p:clrMapOvr>
+</p:sld>
+</file>
+
+<file path=ppt/slides/slide4.xml><?xml version="1.0" encoding="utf-8"?>
 <p:sld xmlns:a="http://schemas.openxmlformats.org/drawingml/2006/main" xmlns:r="http://schemas.openxmlformats.org/officeDocument/2006/relationships" xmlns:p="http://schemas.openxmlformats.org/presentationml/2006/main">
   <p:cSld>
     <p:spTree>
@@ -6355,7 +7648,7 @@
 </p:sld>
 </file>
 
-<file path=ppt/slides/slide4.xml><?xml version="1.0" encoding="utf-8"?>
+<file path=ppt/slides/slide5.xml><?xml version="1.0" encoding="utf-8"?>
 <p:sld xmlns:a="http://schemas.openxmlformats.org/drawingml/2006/main" xmlns:r="http://schemas.openxmlformats.org/officeDocument/2006/relationships" xmlns:p="http://schemas.openxmlformats.org/presentationml/2006/main">
   <p:cSld>
     <p:spTree>

</xml_diff>